<commit_message>
OCP 17 BEGIN !!!!
</commit_message>
<xml_diff>
--- a/OCFA - OCA Presentations/JSE8Foundation/Chapter 3 - Java Basic/Chapter 3 - Java Basic.pptx
+++ b/OCFA - OCA Presentations/JSE8Foundation/Chapter 3 - Java Basic/Chapter 3 - Java Basic.pptx
@@ -11,12 +11,11 @@
     <p:sldId id="260" r:id="rId5"/>
     <p:sldId id="261" r:id="rId6"/>
     <p:sldId id="262" r:id="rId7"/>
-    <p:sldId id="264" r:id="rId8"/>
-    <p:sldId id="265" r:id="rId9"/>
-    <p:sldId id="266" r:id="rId10"/>
-    <p:sldId id="267" r:id="rId11"/>
-    <p:sldId id="268" r:id="rId12"/>
-    <p:sldId id="269" r:id="rId13"/>
+    <p:sldId id="265" r:id="rId8"/>
+    <p:sldId id="266" r:id="rId9"/>
+    <p:sldId id="267" r:id="rId10"/>
+    <p:sldId id="268" r:id="rId11"/>
+    <p:sldId id="269" r:id="rId12"/>
   </p:sldIdLst>
   <p:sldSz cx="12192000" cy="6858000"/>
   <p:notesSz cx="6858000" cy="9144000"/>
@@ -126,7 +125,6 @@
             <p14:sldId id="260"/>
             <p14:sldId id="261"/>
             <p14:sldId id="262"/>
-            <p14:sldId id="264"/>
             <p14:sldId id="265"/>
             <p14:sldId id="266"/>
             <p14:sldId id="267"/>
@@ -1081,7 +1079,7 @@
           <a:p>
             <a:fld id="{BAA8DE05-51EE-4692-B197-877FA1DAAAED}" type="datetimeFigureOut">
               <a:rPr lang="en-US" smtClean="0"/>
-              <a:t>7/14/2024</a:t>
+              <a:t>4/21/25</a:t>
             </a:fld>
             <a:endParaRPr lang="en-US"/>
           </a:p>
@@ -1279,7 +1277,7 @@
           <a:p>
             <a:fld id="{BAA8DE05-51EE-4692-B197-877FA1DAAAED}" type="datetimeFigureOut">
               <a:rPr lang="en-US" smtClean="0"/>
-              <a:t>7/14/2024</a:t>
+              <a:t>4/21/25</a:t>
             </a:fld>
             <a:endParaRPr lang="en-US"/>
           </a:p>
@@ -1487,7 +1485,7 @@
           <a:p>
             <a:fld id="{BAA8DE05-51EE-4692-B197-877FA1DAAAED}" type="datetimeFigureOut">
               <a:rPr lang="en-US" smtClean="0"/>
-              <a:t>7/14/2024</a:t>
+              <a:t>4/21/25</a:t>
             </a:fld>
             <a:endParaRPr lang="en-US"/>
           </a:p>
@@ -1685,7 +1683,7 @@
           <a:p>
             <a:fld id="{BAA8DE05-51EE-4692-B197-877FA1DAAAED}" type="datetimeFigureOut">
               <a:rPr lang="en-US" smtClean="0"/>
-              <a:t>7/14/2024</a:t>
+              <a:t>4/21/25</a:t>
             </a:fld>
             <a:endParaRPr lang="en-US"/>
           </a:p>
@@ -1960,7 +1958,7 @@
           <a:p>
             <a:fld id="{BAA8DE05-51EE-4692-B197-877FA1DAAAED}" type="datetimeFigureOut">
               <a:rPr lang="en-US" smtClean="0"/>
-              <a:t>7/14/2024</a:t>
+              <a:t>4/21/25</a:t>
             </a:fld>
             <a:endParaRPr lang="en-US"/>
           </a:p>
@@ -2225,7 +2223,7 @@
           <a:p>
             <a:fld id="{BAA8DE05-51EE-4692-B197-877FA1DAAAED}" type="datetimeFigureOut">
               <a:rPr lang="en-US" smtClean="0"/>
-              <a:t>7/14/2024</a:t>
+              <a:t>4/21/25</a:t>
             </a:fld>
             <a:endParaRPr lang="en-US"/>
           </a:p>
@@ -2637,7 +2635,7 @@
           <a:p>
             <a:fld id="{BAA8DE05-51EE-4692-B197-877FA1DAAAED}" type="datetimeFigureOut">
               <a:rPr lang="en-US" smtClean="0"/>
-              <a:t>7/14/2024</a:t>
+              <a:t>4/21/25</a:t>
             </a:fld>
             <a:endParaRPr lang="en-US"/>
           </a:p>
@@ -2778,7 +2776,7 @@
           <a:p>
             <a:fld id="{BAA8DE05-51EE-4692-B197-877FA1DAAAED}" type="datetimeFigureOut">
               <a:rPr lang="en-US" smtClean="0"/>
-              <a:t>7/14/2024</a:t>
+              <a:t>4/21/25</a:t>
             </a:fld>
             <a:endParaRPr lang="en-US"/>
           </a:p>
@@ -2891,7 +2889,7 @@
           <a:p>
             <a:fld id="{BAA8DE05-51EE-4692-B197-877FA1DAAAED}" type="datetimeFigureOut">
               <a:rPr lang="en-US" smtClean="0"/>
-              <a:t>7/14/2024</a:t>
+              <a:t>4/21/25</a:t>
             </a:fld>
             <a:endParaRPr lang="en-US"/>
           </a:p>
@@ -3202,7 +3200,7 @@
           <a:p>
             <a:fld id="{BAA8DE05-51EE-4692-B197-877FA1DAAAED}" type="datetimeFigureOut">
               <a:rPr lang="en-US" smtClean="0"/>
-              <a:t>7/14/2024</a:t>
+              <a:t>4/21/25</a:t>
             </a:fld>
             <a:endParaRPr lang="en-US"/>
           </a:p>
@@ -3490,7 +3488,7 @@
           <a:p>
             <a:fld id="{BAA8DE05-51EE-4692-B197-877FA1DAAAED}" type="datetimeFigureOut">
               <a:rPr lang="en-US" smtClean="0"/>
-              <a:t>7/14/2024</a:t>
+              <a:t>4/21/25</a:t>
             </a:fld>
             <a:endParaRPr lang="en-US"/>
           </a:p>
@@ -3731,7 +3729,7 @@
           <a:p>
             <a:fld id="{BAA8DE05-51EE-4692-B197-877FA1DAAAED}" type="datetimeFigureOut">
               <a:rPr lang="en-US" smtClean="0"/>
-              <a:t>7/14/2024</a:t>
+              <a:t>4/21/25</a:t>
             </a:fld>
             <a:endParaRPr lang="en-US"/>
           </a:p>
@@ -4255,947 +4253,6 @@
         <p:spPr>
           <a:xfrm>
             <a:off x="152400" y="217488"/>
-            <a:ext cx="6686550" cy="303212"/>
-          </a:xfrm>
-        </p:spPr>
-        <p:txBody>
-          <a:bodyPr>
-            <a:normAutofit fontScale="92500" lnSpcReduction="20000"/>
-          </a:bodyPr>
-          <a:lstStyle/>
-          <a:p>
-            <a:r>
-              <a:rPr lang="en-US" sz="1800"/>
-              <a:t>3.6 Object-Oriented Programming: </a:t>
-            </a:r>
-            <a:r>
-              <a:rPr lang="en-US" sz="1800" b="1" i="1"/>
-              <a:t>3.6.4 – OOP in Java</a:t>
-            </a:r>
-          </a:p>
-        </p:txBody>
-      </p:sp>
-      <p:sp>
-        <p:nvSpPr>
-          <p:cNvPr id="4" name="Subtitle 2">
-            <a:extLst>
-              <a:ext uri="{FF2B5EF4-FFF2-40B4-BE49-F238E27FC236}">
-                <a16:creationId xmlns:a16="http://schemas.microsoft.com/office/drawing/2014/main" id="{BBA13038-CAB8-FCA0-CDE8-65E40C2F10A3}"/>
-              </a:ext>
-            </a:extLst>
-          </p:cNvPr>
-          <p:cNvSpPr txBox="1">
-            <a:spLocks/>
-          </p:cNvSpPr>
-          <p:nvPr/>
-        </p:nvSpPr>
-        <p:spPr>
-          <a:xfrm>
-            <a:off x="0" y="820738"/>
-            <a:ext cx="12192000" cy="6037262"/>
-          </a:xfrm>
-          <a:prstGeom prst="rect">
-            <a:avLst/>
-          </a:prstGeom>
-        </p:spPr>
-        <p:txBody>
-          <a:bodyPr vert="horz" lIns="91440" tIns="45720" rIns="91440" bIns="45720" rtlCol="0">
-            <a:normAutofit/>
-          </a:bodyPr>
-          <a:lstStyle>
-            <a:lvl1pPr marL="0" indent="0" algn="ctr" defTabSz="914400" rtl="0" eaLnBrk="1" latinLnBrk="0" hangingPunct="1">
-              <a:lnSpc>
-                <a:spcPct val="90000"/>
-              </a:lnSpc>
-              <a:spcBef>
-                <a:spcPts val="1000"/>
-              </a:spcBef>
-              <a:buFont typeface="Arial" panose="020B0604020202020204" pitchFamily="34" charset="0"/>
-              <a:buNone/>
-              <a:defRPr sz="2400" kern="1200">
-                <a:solidFill>
-                  <a:schemeClr val="tx1"/>
-                </a:solidFill>
-                <a:latin typeface="+mn-lt"/>
-                <a:ea typeface="+mn-ea"/>
-                <a:cs typeface="+mn-cs"/>
-              </a:defRPr>
-            </a:lvl1pPr>
-            <a:lvl2pPr marL="457200" indent="0" algn="ctr" defTabSz="914400" rtl="0" eaLnBrk="1" latinLnBrk="0" hangingPunct="1">
-              <a:lnSpc>
-                <a:spcPct val="90000"/>
-              </a:lnSpc>
-              <a:spcBef>
-                <a:spcPts val="500"/>
-              </a:spcBef>
-              <a:buFont typeface="Arial" panose="020B0604020202020204" pitchFamily="34" charset="0"/>
-              <a:buNone/>
-              <a:defRPr sz="2000" kern="1200">
-                <a:solidFill>
-                  <a:schemeClr val="tx1"/>
-                </a:solidFill>
-                <a:latin typeface="+mn-lt"/>
-                <a:ea typeface="+mn-ea"/>
-                <a:cs typeface="+mn-cs"/>
-              </a:defRPr>
-            </a:lvl2pPr>
-            <a:lvl3pPr marL="914400" indent="0" algn="ctr" defTabSz="914400" rtl="0" eaLnBrk="1" latinLnBrk="0" hangingPunct="1">
-              <a:lnSpc>
-                <a:spcPct val="90000"/>
-              </a:lnSpc>
-              <a:spcBef>
-                <a:spcPts val="500"/>
-              </a:spcBef>
-              <a:buFont typeface="Arial" panose="020B0604020202020204" pitchFamily="34" charset="0"/>
-              <a:buNone/>
-              <a:defRPr sz="1800" kern="1200">
-                <a:solidFill>
-                  <a:schemeClr val="tx1"/>
-                </a:solidFill>
-                <a:latin typeface="+mn-lt"/>
-                <a:ea typeface="+mn-ea"/>
-                <a:cs typeface="+mn-cs"/>
-              </a:defRPr>
-            </a:lvl3pPr>
-            <a:lvl4pPr marL="1371600" indent="0" algn="ctr" defTabSz="914400" rtl="0" eaLnBrk="1" latinLnBrk="0" hangingPunct="1">
-              <a:lnSpc>
-                <a:spcPct val="90000"/>
-              </a:lnSpc>
-              <a:spcBef>
-                <a:spcPts val="500"/>
-              </a:spcBef>
-              <a:buFont typeface="Arial" panose="020B0604020202020204" pitchFamily="34" charset="0"/>
-              <a:buNone/>
-              <a:defRPr sz="1600" kern="1200">
-                <a:solidFill>
-                  <a:schemeClr val="tx1"/>
-                </a:solidFill>
-                <a:latin typeface="+mn-lt"/>
-                <a:ea typeface="+mn-ea"/>
-                <a:cs typeface="+mn-cs"/>
-              </a:defRPr>
-            </a:lvl4pPr>
-            <a:lvl5pPr marL="1828800" indent="0" algn="ctr" defTabSz="914400" rtl="0" eaLnBrk="1" latinLnBrk="0" hangingPunct="1">
-              <a:lnSpc>
-                <a:spcPct val="90000"/>
-              </a:lnSpc>
-              <a:spcBef>
-                <a:spcPts val="500"/>
-              </a:spcBef>
-              <a:buFont typeface="Arial" panose="020B0604020202020204" pitchFamily="34" charset="0"/>
-              <a:buNone/>
-              <a:defRPr sz="1600" kern="1200">
-                <a:solidFill>
-                  <a:schemeClr val="tx1"/>
-                </a:solidFill>
-                <a:latin typeface="+mn-lt"/>
-                <a:ea typeface="+mn-ea"/>
-                <a:cs typeface="+mn-cs"/>
-              </a:defRPr>
-            </a:lvl5pPr>
-            <a:lvl6pPr marL="2286000" indent="0" algn="ctr" defTabSz="914400" rtl="0" eaLnBrk="1" latinLnBrk="0" hangingPunct="1">
-              <a:lnSpc>
-                <a:spcPct val="90000"/>
-              </a:lnSpc>
-              <a:spcBef>
-                <a:spcPts val="500"/>
-              </a:spcBef>
-              <a:buFont typeface="Arial" panose="020B0604020202020204" pitchFamily="34" charset="0"/>
-              <a:buNone/>
-              <a:defRPr sz="1600" kern="1200">
-                <a:solidFill>
-                  <a:schemeClr val="tx1"/>
-                </a:solidFill>
-                <a:latin typeface="+mn-lt"/>
-                <a:ea typeface="+mn-ea"/>
-                <a:cs typeface="+mn-cs"/>
-              </a:defRPr>
-            </a:lvl6pPr>
-            <a:lvl7pPr marL="2743200" indent="0" algn="ctr" defTabSz="914400" rtl="0" eaLnBrk="1" latinLnBrk="0" hangingPunct="1">
-              <a:lnSpc>
-                <a:spcPct val="90000"/>
-              </a:lnSpc>
-              <a:spcBef>
-                <a:spcPts val="500"/>
-              </a:spcBef>
-              <a:buFont typeface="Arial" panose="020B0604020202020204" pitchFamily="34" charset="0"/>
-              <a:buNone/>
-              <a:defRPr sz="1600" kern="1200">
-                <a:solidFill>
-                  <a:schemeClr val="tx1"/>
-                </a:solidFill>
-                <a:latin typeface="+mn-lt"/>
-                <a:ea typeface="+mn-ea"/>
-                <a:cs typeface="+mn-cs"/>
-              </a:defRPr>
-            </a:lvl7pPr>
-            <a:lvl8pPr marL="3200400" indent="0" algn="ctr" defTabSz="914400" rtl="0" eaLnBrk="1" latinLnBrk="0" hangingPunct="1">
-              <a:lnSpc>
-                <a:spcPct val="90000"/>
-              </a:lnSpc>
-              <a:spcBef>
-                <a:spcPts val="500"/>
-              </a:spcBef>
-              <a:buFont typeface="Arial" panose="020B0604020202020204" pitchFamily="34" charset="0"/>
-              <a:buNone/>
-              <a:defRPr sz="1600" kern="1200">
-                <a:solidFill>
-                  <a:schemeClr val="tx1"/>
-                </a:solidFill>
-                <a:latin typeface="+mn-lt"/>
-                <a:ea typeface="+mn-ea"/>
-                <a:cs typeface="+mn-cs"/>
-              </a:defRPr>
-            </a:lvl8pPr>
-            <a:lvl9pPr marL="3657600" indent="0" algn="ctr" defTabSz="914400" rtl="0" eaLnBrk="1" latinLnBrk="0" hangingPunct="1">
-              <a:lnSpc>
-                <a:spcPct val="90000"/>
-              </a:lnSpc>
-              <a:spcBef>
-                <a:spcPts val="500"/>
-              </a:spcBef>
-              <a:buFont typeface="Arial" panose="020B0604020202020204" pitchFamily="34" charset="0"/>
-              <a:buNone/>
-              <a:defRPr sz="1600" kern="1200">
-                <a:solidFill>
-                  <a:schemeClr val="tx1"/>
-                </a:solidFill>
-                <a:latin typeface="+mn-lt"/>
-                <a:ea typeface="+mn-ea"/>
-                <a:cs typeface="+mn-cs"/>
-              </a:defRPr>
-            </a:lvl9pPr>
-          </a:lstStyle>
-          <a:p>
-            <a:pPr marL="285750" indent="-285750" algn="l">
-              <a:buFontTx/>
-              <a:buChar char="-"/>
-            </a:pPr>
-            <a:endParaRPr lang="en-GB" sz="1000" i="1"/>
-          </a:p>
-        </p:txBody>
-      </p:sp>
-      <p:sp>
-        <p:nvSpPr>
-          <p:cNvPr id="5" name="Subtitle 2">
-            <a:extLst>
-              <a:ext uri="{FF2B5EF4-FFF2-40B4-BE49-F238E27FC236}">
-                <a16:creationId xmlns:a16="http://schemas.microsoft.com/office/drawing/2014/main" id="{BBA13038-CAB8-FCA0-CDE8-65E40C2F10A3}"/>
-              </a:ext>
-            </a:extLst>
-          </p:cNvPr>
-          <p:cNvSpPr txBox="1">
-            <a:spLocks/>
-          </p:cNvSpPr>
-          <p:nvPr/>
-        </p:nvSpPr>
-        <p:spPr>
-          <a:xfrm>
-            <a:off x="1835150" y="3429000"/>
-            <a:ext cx="9137650" cy="2400657"/>
-          </a:xfrm>
-          <a:prstGeom prst="rect">
-            <a:avLst/>
-          </a:prstGeom>
-        </p:spPr>
-        <p:txBody>
-          <a:bodyPr vert="horz" lIns="91440" tIns="45720" rIns="91440" bIns="45720" rtlCol="0">
-            <a:normAutofit/>
-          </a:bodyPr>
-          <a:lstStyle>
-            <a:lvl1pPr marL="0" indent="0" algn="ctr" defTabSz="914400" rtl="0" eaLnBrk="1" latinLnBrk="0" hangingPunct="1">
-              <a:lnSpc>
-                <a:spcPct val="90000"/>
-              </a:lnSpc>
-              <a:spcBef>
-                <a:spcPts val="1000"/>
-              </a:spcBef>
-              <a:buFont typeface="Arial" panose="020B0604020202020204" pitchFamily="34" charset="0"/>
-              <a:buNone/>
-              <a:defRPr sz="2400" kern="1200">
-                <a:solidFill>
-                  <a:schemeClr val="tx1"/>
-                </a:solidFill>
-                <a:latin typeface="+mn-lt"/>
-                <a:ea typeface="+mn-ea"/>
-                <a:cs typeface="+mn-cs"/>
-              </a:defRPr>
-            </a:lvl1pPr>
-            <a:lvl2pPr marL="457200" indent="0" algn="ctr" defTabSz="914400" rtl="0" eaLnBrk="1" latinLnBrk="0" hangingPunct="1">
-              <a:lnSpc>
-                <a:spcPct val="90000"/>
-              </a:lnSpc>
-              <a:spcBef>
-                <a:spcPts val="500"/>
-              </a:spcBef>
-              <a:buFont typeface="Arial" panose="020B0604020202020204" pitchFamily="34" charset="0"/>
-              <a:buNone/>
-              <a:defRPr sz="2000" kern="1200">
-                <a:solidFill>
-                  <a:schemeClr val="tx1"/>
-                </a:solidFill>
-                <a:latin typeface="+mn-lt"/>
-                <a:ea typeface="+mn-ea"/>
-                <a:cs typeface="+mn-cs"/>
-              </a:defRPr>
-            </a:lvl2pPr>
-            <a:lvl3pPr marL="914400" indent="0" algn="ctr" defTabSz="914400" rtl="0" eaLnBrk="1" latinLnBrk="0" hangingPunct="1">
-              <a:lnSpc>
-                <a:spcPct val="90000"/>
-              </a:lnSpc>
-              <a:spcBef>
-                <a:spcPts val="500"/>
-              </a:spcBef>
-              <a:buFont typeface="Arial" panose="020B0604020202020204" pitchFamily="34" charset="0"/>
-              <a:buNone/>
-              <a:defRPr sz="1800" kern="1200">
-                <a:solidFill>
-                  <a:schemeClr val="tx1"/>
-                </a:solidFill>
-                <a:latin typeface="+mn-lt"/>
-                <a:ea typeface="+mn-ea"/>
-                <a:cs typeface="+mn-cs"/>
-              </a:defRPr>
-            </a:lvl3pPr>
-            <a:lvl4pPr marL="1371600" indent="0" algn="ctr" defTabSz="914400" rtl="0" eaLnBrk="1" latinLnBrk="0" hangingPunct="1">
-              <a:lnSpc>
-                <a:spcPct val="90000"/>
-              </a:lnSpc>
-              <a:spcBef>
-                <a:spcPts val="500"/>
-              </a:spcBef>
-              <a:buFont typeface="Arial" panose="020B0604020202020204" pitchFamily="34" charset="0"/>
-              <a:buNone/>
-              <a:defRPr sz="1600" kern="1200">
-                <a:solidFill>
-                  <a:schemeClr val="tx1"/>
-                </a:solidFill>
-                <a:latin typeface="+mn-lt"/>
-                <a:ea typeface="+mn-ea"/>
-                <a:cs typeface="+mn-cs"/>
-              </a:defRPr>
-            </a:lvl4pPr>
-            <a:lvl5pPr marL="1828800" indent="0" algn="ctr" defTabSz="914400" rtl="0" eaLnBrk="1" latinLnBrk="0" hangingPunct="1">
-              <a:lnSpc>
-                <a:spcPct val="90000"/>
-              </a:lnSpc>
-              <a:spcBef>
-                <a:spcPts val="500"/>
-              </a:spcBef>
-              <a:buFont typeface="Arial" panose="020B0604020202020204" pitchFamily="34" charset="0"/>
-              <a:buNone/>
-              <a:defRPr sz="1600" kern="1200">
-                <a:solidFill>
-                  <a:schemeClr val="tx1"/>
-                </a:solidFill>
-                <a:latin typeface="+mn-lt"/>
-                <a:ea typeface="+mn-ea"/>
-                <a:cs typeface="+mn-cs"/>
-              </a:defRPr>
-            </a:lvl5pPr>
-            <a:lvl6pPr marL="2286000" indent="0" algn="ctr" defTabSz="914400" rtl="0" eaLnBrk="1" latinLnBrk="0" hangingPunct="1">
-              <a:lnSpc>
-                <a:spcPct val="90000"/>
-              </a:lnSpc>
-              <a:spcBef>
-                <a:spcPts val="500"/>
-              </a:spcBef>
-              <a:buFont typeface="Arial" panose="020B0604020202020204" pitchFamily="34" charset="0"/>
-              <a:buNone/>
-              <a:defRPr sz="1600" kern="1200">
-                <a:solidFill>
-                  <a:schemeClr val="tx1"/>
-                </a:solidFill>
-                <a:latin typeface="+mn-lt"/>
-                <a:ea typeface="+mn-ea"/>
-                <a:cs typeface="+mn-cs"/>
-              </a:defRPr>
-            </a:lvl6pPr>
-            <a:lvl7pPr marL="2743200" indent="0" algn="ctr" defTabSz="914400" rtl="0" eaLnBrk="1" latinLnBrk="0" hangingPunct="1">
-              <a:lnSpc>
-                <a:spcPct val="90000"/>
-              </a:lnSpc>
-              <a:spcBef>
-                <a:spcPts val="500"/>
-              </a:spcBef>
-              <a:buFont typeface="Arial" panose="020B0604020202020204" pitchFamily="34" charset="0"/>
-              <a:buNone/>
-              <a:defRPr sz="1600" kern="1200">
-                <a:solidFill>
-                  <a:schemeClr val="tx1"/>
-                </a:solidFill>
-                <a:latin typeface="+mn-lt"/>
-                <a:ea typeface="+mn-ea"/>
-                <a:cs typeface="+mn-cs"/>
-              </a:defRPr>
-            </a:lvl7pPr>
-            <a:lvl8pPr marL="3200400" indent="0" algn="ctr" defTabSz="914400" rtl="0" eaLnBrk="1" latinLnBrk="0" hangingPunct="1">
-              <a:lnSpc>
-                <a:spcPct val="90000"/>
-              </a:lnSpc>
-              <a:spcBef>
-                <a:spcPts val="500"/>
-              </a:spcBef>
-              <a:buFont typeface="Arial" panose="020B0604020202020204" pitchFamily="34" charset="0"/>
-              <a:buNone/>
-              <a:defRPr sz="1600" kern="1200">
-                <a:solidFill>
-                  <a:schemeClr val="tx1"/>
-                </a:solidFill>
-                <a:latin typeface="+mn-lt"/>
-                <a:ea typeface="+mn-ea"/>
-                <a:cs typeface="+mn-cs"/>
-              </a:defRPr>
-            </a:lvl8pPr>
-            <a:lvl9pPr marL="3657600" indent="0" algn="ctr" defTabSz="914400" rtl="0" eaLnBrk="1" latinLnBrk="0" hangingPunct="1">
-              <a:lnSpc>
-                <a:spcPct val="90000"/>
-              </a:lnSpc>
-              <a:spcBef>
-                <a:spcPts val="500"/>
-              </a:spcBef>
-              <a:buFont typeface="Arial" panose="020B0604020202020204" pitchFamily="34" charset="0"/>
-              <a:buNone/>
-              <a:defRPr sz="1600" kern="1200">
-                <a:solidFill>
-                  <a:schemeClr val="tx1"/>
-                </a:solidFill>
-                <a:latin typeface="+mn-lt"/>
-                <a:ea typeface="+mn-ea"/>
-                <a:cs typeface="+mn-cs"/>
-              </a:defRPr>
-            </a:lvl9pPr>
-          </a:lstStyle>
-          <a:p>
-            <a:pPr marL="285750" indent="-285750" algn="l">
-              <a:buFontTx/>
-              <a:buChar char="-"/>
-            </a:pPr>
-            <a:endParaRPr lang="en-GB" sz="1000" i="1"/>
-          </a:p>
-        </p:txBody>
-      </p:sp>
-      <p:sp>
-        <p:nvSpPr>
-          <p:cNvPr id="7" name="Subtitle 2">
-            <a:extLst>
-              <a:ext uri="{FF2B5EF4-FFF2-40B4-BE49-F238E27FC236}">
-                <a16:creationId xmlns:a16="http://schemas.microsoft.com/office/drawing/2014/main" id="{735C0034-9699-F9D9-6534-306539359175}"/>
-              </a:ext>
-            </a:extLst>
-          </p:cNvPr>
-          <p:cNvSpPr txBox="1">
-            <a:spLocks/>
-          </p:cNvSpPr>
-          <p:nvPr/>
-        </p:nvSpPr>
-        <p:spPr>
-          <a:xfrm>
-            <a:off x="0" y="2028102"/>
-            <a:ext cx="12192000" cy="4829898"/>
-          </a:xfrm>
-          <a:prstGeom prst="rect">
-            <a:avLst/>
-          </a:prstGeom>
-        </p:spPr>
-        <p:txBody>
-          <a:bodyPr vert="horz" lIns="91440" tIns="45720" rIns="91440" bIns="45720" rtlCol="0">
-            <a:normAutofit/>
-          </a:bodyPr>
-          <a:lstStyle>
-            <a:lvl1pPr marL="0" indent="0" algn="ctr" defTabSz="914400" rtl="0" eaLnBrk="1" latinLnBrk="0" hangingPunct="1">
-              <a:lnSpc>
-                <a:spcPct val="90000"/>
-              </a:lnSpc>
-              <a:spcBef>
-                <a:spcPts val="1000"/>
-              </a:spcBef>
-              <a:buFont typeface="Arial" panose="020B0604020202020204" pitchFamily="34" charset="0"/>
-              <a:buNone/>
-              <a:defRPr sz="2400" kern="1200">
-                <a:solidFill>
-                  <a:schemeClr val="tx1"/>
-                </a:solidFill>
-                <a:latin typeface="+mn-lt"/>
-                <a:ea typeface="+mn-ea"/>
-                <a:cs typeface="+mn-cs"/>
-              </a:defRPr>
-            </a:lvl1pPr>
-            <a:lvl2pPr marL="457200" indent="0" algn="ctr" defTabSz="914400" rtl="0" eaLnBrk="1" latinLnBrk="0" hangingPunct="1">
-              <a:lnSpc>
-                <a:spcPct val="90000"/>
-              </a:lnSpc>
-              <a:spcBef>
-                <a:spcPts val="500"/>
-              </a:spcBef>
-              <a:buFont typeface="Arial" panose="020B0604020202020204" pitchFamily="34" charset="0"/>
-              <a:buNone/>
-              <a:defRPr sz="2000" kern="1200">
-                <a:solidFill>
-                  <a:schemeClr val="tx1"/>
-                </a:solidFill>
-                <a:latin typeface="+mn-lt"/>
-                <a:ea typeface="+mn-ea"/>
-                <a:cs typeface="+mn-cs"/>
-              </a:defRPr>
-            </a:lvl2pPr>
-            <a:lvl3pPr marL="914400" indent="0" algn="ctr" defTabSz="914400" rtl="0" eaLnBrk="1" latinLnBrk="0" hangingPunct="1">
-              <a:lnSpc>
-                <a:spcPct val="90000"/>
-              </a:lnSpc>
-              <a:spcBef>
-                <a:spcPts val="500"/>
-              </a:spcBef>
-              <a:buFont typeface="Arial" panose="020B0604020202020204" pitchFamily="34" charset="0"/>
-              <a:buNone/>
-              <a:defRPr sz="1800" kern="1200">
-                <a:solidFill>
-                  <a:schemeClr val="tx1"/>
-                </a:solidFill>
-                <a:latin typeface="+mn-lt"/>
-                <a:ea typeface="+mn-ea"/>
-                <a:cs typeface="+mn-cs"/>
-              </a:defRPr>
-            </a:lvl3pPr>
-            <a:lvl4pPr marL="1371600" indent="0" algn="ctr" defTabSz="914400" rtl="0" eaLnBrk="1" latinLnBrk="0" hangingPunct="1">
-              <a:lnSpc>
-                <a:spcPct val="90000"/>
-              </a:lnSpc>
-              <a:spcBef>
-                <a:spcPts val="500"/>
-              </a:spcBef>
-              <a:buFont typeface="Arial" panose="020B0604020202020204" pitchFamily="34" charset="0"/>
-              <a:buNone/>
-              <a:defRPr sz="1600" kern="1200">
-                <a:solidFill>
-                  <a:schemeClr val="tx1"/>
-                </a:solidFill>
-                <a:latin typeface="+mn-lt"/>
-                <a:ea typeface="+mn-ea"/>
-                <a:cs typeface="+mn-cs"/>
-              </a:defRPr>
-            </a:lvl4pPr>
-            <a:lvl5pPr marL="1828800" indent="0" algn="ctr" defTabSz="914400" rtl="0" eaLnBrk="1" latinLnBrk="0" hangingPunct="1">
-              <a:lnSpc>
-                <a:spcPct val="90000"/>
-              </a:lnSpc>
-              <a:spcBef>
-                <a:spcPts val="500"/>
-              </a:spcBef>
-              <a:buFont typeface="Arial" panose="020B0604020202020204" pitchFamily="34" charset="0"/>
-              <a:buNone/>
-              <a:defRPr sz="1600" kern="1200">
-                <a:solidFill>
-                  <a:schemeClr val="tx1"/>
-                </a:solidFill>
-                <a:latin typeface="+mn-lt"/>
-                <a:ea typeface="+mn-ea"/>
-                <a:cs typeface="+mn-cs"/>
-              </a:defRPr>
-            </a:lvl5pPr>
-            <a:lvl6pPr marL="2286000" indent="0" algn="ctr" defTabSz="914400" rtl="0" eaLnBrk="1" latinLnBrk="0" hangingPunct="1">
-              <a:lnSpc>
-                <a:spcPct val="90000"/>
-              </a:lnSpc>
-              <a:spcBef>
-                <a:spcPts val="500"/>
-              </a:spcBef>
-              <a:buFont typeface="Arial" panose="020B0604020202020204" pitchFamily="34" charset="0"/>
-              <a:buNone/>
-              <a:defRPr sz="1600" kern="1200">
-                <a:solidFill>
-                  <a:schemeClr val="tx1"/>
-                </a:solidFill>
-                <a:latin typeface="+mn-lt"/>
-                <a:ea typeface="+mn-ea"/>
-                <a:cs typeface="+mn-cs"/>
-              </a:defRPr>
-            </a:lvl6pPr>
-            <a:lvl7pPr marL="2743200" indent="0" algn="ctr" defTabSz="914400" rtl="0" eaLnBrk="1" latinLnBrk="0" hangingPunct="1">
-              <a:lnSpc>
-                <a:spcPct val="90000"/>
-              </a:lnSpc>
-              <a:spcBef>
-                <a:spcPts val="500"/>
-              </a:spcBef>
-              <a:buFont typeface="Arial" panose="020B0604020202020204" pitchFamily="34" charset="0"/>
-              <a:buNone/>
-              <a:defRPr sz="1600" kern="1200">
-                <a:solidFill>
-                  <a:schemeClr val="tx1"/>
-                </a:solidFill>
-                <a:latin typeface="+mn-lt"/>
-                <a:ea typeface="+mn-ea"/>
-                <a:cs typeface="+mn-cs"/>
-              </a:defRPr>
-            </a:lvl7pPr>
-            <a:lvl8pPr marL="3200400" indent="0" algn="ctr" defTabSz="914400" rtl="0" eaLnBrk="1" latinLnBrk="0" hangingPunct="1">
-              <a:lnSpc>
-                <a:spcPct val="90000"/>
-              </a:lnSpc>
-              <a:spcBef>
-                <a:spcPts val="500"/>
-              </a:spcBef>
-              <a:buFont typeface="Arial" panose="020B0604020202020204" pitchFamily="34" charset="0"/>
-              <a:buNone/>
-              <a:defRPr sz="1600" kern="1200">
-                <a:solidFill>
-                  <a:schemeClr val="tx1"/>
-                </a:solidFill>
-                <a:latin typeface="+mn-lt"/>
-                <a:ea typeface="+mn-ea"/>
-                <a:cs typeface="+mn-cs"/>
-              </a:defRPr>
-            </a:lvl8pPr>
-            <a:lvl9pPr marL="3657600" indent="0" algn="ctr" defTabSz="914400" rtl="0" eaLnBrk="1" latinLnBrk="0" hangingPunct="1">
-              <a:lnSpc>
-                <a:spcPct val="90000"/>
-              </a:lnSpc>
-              <a:spcBef>
-                <a:spcPts val="500"/>
-              </a:spcBef>
-              <a:buFont typeface="Arial" panose="020B0604020202020204" pitchFamily="34" charset="0"/>
-              <a:buNone/>
-              <a:defRPr sz="1600" kern="1200">
-                <a:solidFill>
-                  <a:schemeClr val="tx1"/>
-                </a:solidFill>
-                <a:latin typeface="+mn-lt"/>
-                <a:ea typeface="+mn-ea"/>
-                <a:cs typeface="+mn-cs"/>
-              </a:defRPr>
-            </a:lvl9pPr>
-          </a:lstStyle>
-          <a:p>
-            <a:pPr marL="285750" indent="-285750" algn="l">
-              <a:buFontTx/>
-              <a:buChar char="-"/>
-            </a:pPr>
-            <a:endParaRPr lang="en-GB" sz="1800"/>
-          </a:p>
-          <a:p>
-            <a:pPr marL="285750" indent="-285750" algn="l">
-              <a:buFontTx/>
-              <a:buChar char="-"/>
-            </a:pPr>
-            <a:endParaRPr lang="en-GB" sz="1000" i="1"/>
-          </a:p>
-        </p:txBody>
-      </p:sp>
-      <p:sp>
-        <p:nvSpPr>
-          <p:cNvPr id="6" name="Subtitle 2">
-            <a:extLst>
-              <a:ext uri="{FF2B5EF4-FFF2-40B4-BE49-F238E27FC236}">
-                <a16:creationId xmlns:a16="http://schemas.microsoft.com/office/drawing/2014/main" id="{B6186AA4-73D5-4BB7-63DD-3879981B8F89}"/>
-              </a:ext>
-            </a:extLst>
-          </p:cNvPr>
-          <p:cNvSpPr txBox="1">
-            <a:spLocks/>
-          </p:cNvSpPr>
-          <p:nvPr/>
-        </p:nvSpPr>
-        <p:spPr>
-          <a:xfrm>
-            <a:off x="0" y="1098550"/>
-            <a:ext cx="12192000" cy="5759450"/>
-          </a:xfrm>
-          <a:prstGeom prst="rect">
-            <a:avLst/>
-          </a:prstGeom>
-        </p:spPr>
-        <p:txBody>
-          <a:bodyPr vert="horz" lIns="91440" tIns="45720" rIns="91440" bIns="45720" rtlCol="0">
-            <a:normAutofit/>
-          </a:bodyPr>
-          <a:lstStyle>
-            <a:lvl1pPr marL="0" indent="0" algn="ctr" defTabSz="914400" rtl="0" eaLnBrk="1" latinLnBrk="0" hangingPunct="1">
-              <a:lnSpc>
-                <a:spcPct val="90000"/>
-              </a:lnSpc>
-              <a:spcBef>
-                <a:spcPts val="1000"/>
-              </a:spcBef>
-              <a:buFont typeface="Arial" panose="020B0604020202020204" pitchFamily="34" charset="0"/>
-              <a:buNone/>
-              <a:defRPr sz="2400" kern="1200">
-                <a:solidFill>
-                  <a:schemeClr val="tx1"/>
-                </a:solidFill>
-                <a:latin typeface="+mn-lt"/>
-                <a:ea typeface="+mn-ea"/>
-                <a:cs typeface="+mn-cs"/>
-              </a:defRPr>
-            </a:lvl1pPr>
-            <a:lvl2pPr marL="457200" indent="0" algn="ctr" defTabSz="914400" rtl="0" eaLnBrk="1" latinLnBrk="0" hangingPunct="1">
-              <a:lnSpc>
-                <a:spcPct val="90000"/>
-              </a:lnSpc>
-              <a:spcBef>
-                <a:spcPts val="500"/>
-              </a:spcBef>
-              <a:buFont typeface="Arial" panose="020B0604020202020204" pitchFamily="34" charset="0"/>
-              <a:buNone/>
-              <a:defRPr sz="2000" kern="1200">
-                <a:solidFill>
-                  <a:schemeClr val="tx1"/>
-                </a:solidFill>
-                <a:latin typeface="+mn-lt"/>
-                <a:ea typeface="+mn-ea"/>
-                <a:cs typeface="+mn-cs"/>
-              </a:defRPr>
-            </a:lvl2pPr>
-            <a:lvl3pPr marL="914400" indent="0" algn="ctr" defTabSz="914400" rtl="0" eaLnBrk="1" latinLnBrk="0" hangingPunct="1">
-              <a:lnSpc>
-                <a:spcPct val="90000"/>
-              </a:lnSpc>
-              <a:spcBef>
-                <a:spcPts val="500"/>
-              </a:spcBef>
-              <a:buFont typeface="Arial" panose="020B0604020202020204" pitchFamily="34" charset="0"/>
-              <a:buNone/>
-              <a:defRPr sz="1800" kern="1200">
-                <a:solidFill>
-                  <a:schemeClr val="tx1"/>
-                </a:solidFill>
-                <a:latin typeface="+mn-lt"/>
-                <a:ea typeface="+mn-ea"/>
-                <a:cs typeface="+mn-cs"/>
-              </a:defRPr>
-            </a:lvl3pPr>
-            <a:lvl4pPr marL="1371600" indent="0" algn="ctr" defTabSz="914400" rtl="0" eaLnBrk="1" latinLnBrk="0" hangingPunct="1">
-              <a:lnSpc>
-                <a:spcPct val="90000"/>
-              </a:lnSpc>
-              <a:spcBef>
-                <a:spcPts val="500"/>
-              </a:spcBef>
-              <a:buFont typeface="Arial" panose="020B0604020202020204" pitchFamily="34" charset="0"/>
-              <a:buNone/>
-              <a:defRPr sz="1600" kern="1200">
-                <a:solidFill>
-                  <a:schemeClr val="tx1"/>
-                </a:solidFill>
-                <a:latin typeface="+mn-lt"/>
-                <a:ea typeface="+mn-ea"/>
-                <a:cs typeface="+mn-cs"/>
-              </a:defRPr>
-            </a:lvl4pPr>
-            <a:lvl5pPr marL="1828800" indent="0" algn="ctr" defTabSz="914400" rtl="0" eaLnBrk="1" latinLnBrk="0" hangingPunct="1">
-              <a:lnSpc>
-                <a:spcPct val="90000"/>
-              </a:lnSpc>
-              <a:spcBef>
-                <a:spcPts val="500"/>
-              </a:spcBef>
-              <a:buFont typeface="Arial" panose="020B0604020202020204" pitchFamily="34" charset="0"/>
-              <a:buNone/>
-              <a:defRPr sz="1600" kern="1200">
-                <a:solidFill>
-                  <a:schemeClr val="tx1"/>
-                </a:solidFill>
-                <a:latin typeface="+mn-lt"/>
-                <a:ea typeface="+mn-ea"/>
-                <a:cs typeface="+mn-cs"/>
-              </a:defRPr>
-            </a:lvl5pPr>
-            <a:lvl6pPr marL="2286000" indent="0" algn="ctr" defTabSz="914400" rtl="0" eaLnBrk="1" latinLnBrk="0" hangingPunct="1">
-              <a:lnSpc>
-                <a:spcPct val="90000"/>
-              </a:lnSpc>
-              <a:spcBef>
-                <a:spcPts val="500"/>
-              </a:spcBef>
-              <a:buFont typeface="Arial" panose="020B0604020202020204" pitchFamily="34" charset="0"/>
-              <a:buNone/>
-              <a:defRPr sz="1600" kern="1200">
-                <a:solidFill>
-                  <a:schemeClr val="tx1"/>
-                </a:solidFill>
-                <a:latin typeface="+mn-lt"/>
-                <a:ea typeface="+mn-ea"/>
-                <a:cs typeface="+mn-cs"/>
-              </a:defRPr>
-            </a:lvl6pPr>
-            <a:lvl7pPr marL="2743200" indent="0" algn="ctr" defTabSz="914400" rtl="0" eaLnBrk="1" latinLnBrk="0" hangingPunct="1">
-              <a:lnSpc>
-                <a:spcPct val="90000"/>
-              </a:lnSpc>
-              <a:spcBef>
-                <a:spcPts val="500"/>
-              </a:spcBef>
-              <a:buFont typeface="Arial" panose="020B0604020202020204" pitchFamily="34" charset="0"/>
-              <a:buNone/>
-              <a:defRPr sz="1600" kern="1200">
-                <a:solidFill>
-                  <a:schemeClr val="tx1"/>
-                </a:solidFill>
-                <a:latin typeface="+mn-lt"/>
-                <a:ea typeface="+mn-ea"/>
-                <a:cs typeface="+mn-cs"/>
-              </a:defRPr>
-            </a:lvl7pPr>
-            <a:lvl8pPr marL="3200400" indent="0" algn="ctr" defTabSz="914400" rtl="0" eaLnBrk="1" latinLnBrk="0" hangingPunct="1">
-              <a:lnSpc>
-                <a:spcPct val="90000"/>
-              </a:lnSpc>
-              <a:spcBef>
-                <a:spcPts val="500"/>
-              </a:spcBef>
-              <a:buFont typeface="Arial" panose="020B0604020202020204" pitchFamily="34" charset="0"/>
-              <a:buNone/>
-              <a:defRPr sz="1600" kern="1200">
-                <a:solidFill>
-                  <a:schemeClr val="tx1"/>
-                </a:solidFill>
-                <a:latin typeface="+mn-lt"/>
-                <a:ea typeface="+mn-ea"/>
-                <a:cs typeface="+mn-cs"/>
-              </a:defRPr>
-            </a:lvl8pPr>
-            <a:lvl9pPr marL="3657600" indent="0" algn="ctr" defTabSz="914400" rtl="0" eaLnBrk="1" latinLnBrk="0" hangingPunct="1">
-              <a:lnSpc>
-                <a:spcPct val="90000"/>
-              </a:lnSpc>
-              <a:spcBef>
-                <a:spcPts val="500"/>
-              </a:spcBef>
-              <a:buFont typeface="Arial" panose="020B0604020202020204" pitchFamily="34" charset="0"/>
-              <a:buNone/>
-              <a:defRPr sz="1600" kern="1200">
-                <a:solidFill>
-                  <a:schemeClr val="tx1"/>
-                </a:solidFill>
-                <a:latin typeface="+mn-lt"/>
-                <a:ea typeface="+mn-ea"/>
-                <a:cs typeface="+mn-cs"/>
-              </a:defRPr>
-            </a:lvl9pPr>
-          </a:lstStyle>
-          <a:p>
-            <a:pPr algn="l"/>
-            <a:r>
-              <a:rPr lang="en-GB" sz="1800"/>
-              <a:t>III) Creating object </a:t>
-            </a:r>
-            <a:r>
-              <a:rPr lang="en-GB" sz="800" b="1" i="1"/>
-              <a:t>(illustrating the code)</a:t>
-            </a:r>
-          </a:p>
-          <a:p>
-            <a:pPr algn="l"/>
-            <a:r>
-              <a:rPr lang="en-GB" sz="1800"/>
-              <a:t>IV) Making objects interact</a:t>
-            </a:r>
-          </a:p>
-          <a:p>
-            <a:pPr marL="285750" indent="-285750" algn="l">
-              <a:buFontTx/>
-              <a:buChar char="-"/>
-            </a:pPr>
-            <a:r>
-              <a:rPr lang="en-GB" sz="1800"/>
-              <a:t>Interact by </a:t>
-            </a:r>
-            <a:r>
-              <a:rPr lang="en-GB" sz="1800" b="1" i="1">
-                <a:solidFill>
-                  <a:srgbClr val="FF0000"/>
-                </a:solidFill>
-              </a:rPr>
-              <a:t>“reference”</a:t>
-            </a:r>
-          </a:p>
-          <a:p>
-            <a:pPr algn="l"/>
-            <a:r>
-              <a:rPr lang="en-GB" sz="1800"/>
-              <a:t>V) Launching a Java program </a:t>
-            </a:r>
-            <a:r>
-              <a:rPr lang="en-GB" sz="800" b="1" i="1"/>
-              <a:t>(illustrating the code)</a:t>
-            </a:r>
-          </a:p>
-          <a:p>
-            <a:pPr marL="285750" indent="-285750" algn="l">
-              <a:buFontTx/>
-              <a:buChar char="-"/>
-            </a:pPr>
-            <a:r>
-              <a:rPr lang="en-GB" sz="1800"/>
-              <a:t>“main” =&gt; object interact </a:t>
-            </a:r>
-          </a:p>
-          <a:p>
-            <a:pPr algn="l"/>
-            <a:endParaRPr lang="en-GB" sz="1800"/>
-          </a:p>
-          <a:p>
-            <a:pPr algn="l"/>
-            <a:r>
-              <a:rPr lang="en-GB" sz="800"/>
-              <a:t> </a:t>
-            </a:r>
-          </a:p>
-          <a:p>
-            <a:pPr algn="l"/>
-            <a:endParaRPr lang="en-GB" sz="800" b="1" i="1"/>
-          </a:p>
-        </p:txBody>
-      </p:sp>
-    </p:spTree>
-    <p:extLst>
-      <p:ext uri="{BB962C8B-B14F-4D97-AF65-F5344CB8AC3E}">
-        <p14:creationId xmlns:p14="http://schemas.microsoft.com/office/powerpoint/2010/main" val="3360451873"/>
-      </p:ext>
-    </p:extLst>
-  </p:cSld>
-  <p:clrMapOvr>
-    <a:masterClrMapping/>
-  </p:clrMapOvr>
-</p:sld>
-</file>
-
-<file path=ppt/slides/slide11.xml><?xml version="1.0" encoding="utf-8"?>
-<p:sld xmlns:a="http://schemas.openxmlformats.org/drawingml/2006/main" xmlns:r="http://schemas.openxmlformats.org/officeDocument/2006/relationships" xmlns:p="http://schemas.openxmlformats.org/presentationml/2006/main">
-  <p:cSld>
-    <p:spTree>
-      <p:nvGrpSpPr>
-        <p:cNvPr id="1" name=""/>
-        <p:cNvGrpSpPr/>
-        <p:nvPr/>
-      </p:nvGrpSpPr>
-      <p:grpSpPr>
-        <a:xfrm>
-          <a:off x="0" y="0"/>
-          <a:ext cx="0" cy="0"/>
-          <a:chOff x="0" y="0"/>
-          <a:chExt cx="0" cy="0"/>
-        </a:xfrm>
-      </p:grpSpPr>
-      <p:sp>
-        <p:nvSpPr>
-          <p:cNvPr id="3" name="Subtitle 2">
-            <a:extLst>
-              <a:ext uri="{FF2B5EF4-FFF2-40B4-BE49-F238E27FC236}">
-                <a16:creationId xmlns:a16="http://schemas.microsoft.com/office/drawing/2014/main" id="{96DD8BC4-D539-661E-8A88-53AF6C208F93}"/>
-              </a:ext>
-            </a:extLst>
-          </p:cNvPr>
-          <p:cNvSpPr>
-            <a:spLocks noGrp="1"/>
-          </p:cNvSpPr>
-          <p:nvPr>
-            <p:ph type="subTitle" idx="1"/>
-          </p:nvPr>
-        </p:nvSpPr>
-        <p:spPr>
-          <a:xfrm>
-            <a:off x="152400" y="217488"/>
             <a:ext cx="9505950" cy="303212"/>
           </a:xfrm>
         </p:spPr>
@@ -6129,7 +5186,7 @@
 </p:sld>
 </file>
 
-<file path=ppt/slides/slide12.xml><?xml version="1.0" encoding="utf-8"?>
+<file path=ppt/slides/slide11.xml><?xml version="1.0" encoding="utf-8"?>
 <p:sld xmlns:a="http://schemas.openxmlformats.org/drawingml/2006/main" xmlns:r="http://schemas.openxmlformats.org/officeDocument/2006/relationships" xmlns:p="http://schemas.openxmlformats.org/presentationml/2006/main">
   <p:cSld>
     <p:spTree>
@@ -10357,949 +9414,6 @@
         </p:spPr>
         <p:txBody>
           <a:bodyPr>
-            <a:normAutofit fontScale="85000" lnSpcReduction="10000"/>
-          </a:bodyPr>
-          <a:lstStyle/>
-          <a:p>
-            <a:r>
-              <a:rPr lang="en-GB" sz="1800"/>
-              <a:t>3.5 – Understanding the “MAIN” method: </a:t>
-            </a:r>
-            <a:r>
-              <a:rPr lang="en-GB" sz="1800" b="1" i="1"/>
-              <a:t>3.5.3 – The end of “main” function</a:t>
-            </a:r>
-            <a:endParaRPr lang="en-US" sz="1800"/>
-          </a:p>
-        </p:txBody>
-      </p:sp>
-      <p:sp>
-        <p:nvSpPr>
-          <p:cNvPr id="4" name="Subtitle 2">
-            <a:extLst>
-              <a:ext uri="{FF2B5EF4-FFF2-40B4-BE49-F238E27FC236}">
-                <a16:creationId xmlns:a16="http://schemas.microsoft.com/office/drawing/2014/main" id="{BBA13038-CAB8-FCA0-CDE8-65E40C2F10A3}"/>
-              </a:ext>
-            </a:extLst>
-          </p:cNvPr>
-          <p:cNvSpPr txBox="1">
-            <a:spLocks/>
-          </p:cNvSpPr>
-          <p:nvPr/>
-        </p:nvSpPr>
-        <p:spPr>
-          <a:xfrm>
-            <a:off x="0" y="820738"/>
-            <a:ext cx="12192000" cy="6037262"/>
-          </a:xfrm>
-          <a:prstGeom prst="rect">
-            <a:avLst/>
-          </a:prstGeom>
-        </p:spPr>
-        <p:txBody>
-          <a:bodyPr vert="horz" lIns="91440" tIns="45720" rIns="91440" bIns="45720" rtlCol="0">
-            <a:normAutofit/>
-          </a:bodyPr>
-          <a:lstStyle>
-            <a:lvl1pPr marL="0" indent="0" algn="ctr" defTabSz="914400" rtl="0" eaLnBrk="1" latinLnBrk="0" hangingPunct="1">
-              <a:lnSpc>
-                <a:spcPct val="90000"/>
-              </a:lnSpc>
-              <a:spcBef>
-                <a:spcPts val="1000"/>
-              </a:spcBef>
-              <a:buFont typeface="Arial" panose="020B0604020202020204" pitchFamily="34" charset="0"/>
-              <a:buNone/>
-              <a:defRPr sz="2400" kern="1200">
-                <a:solidFill>
-                  <a:schemeClr val="tx1"/>
-                </a:solidFill>
-                <a:latin typeface="+mn-lt"/>
-                <a:ea typeface="+mn-ea"/>
-                <a:cs typeface="+mn-cs"/>
-              </a:defRPr>
-            </a:lvl1pPr>
-            <a:lvl2pPr marL="457200" indent="0" algn="ctr" defTabSz="914400" rtl="0" eaLnBrk="1" latinLnBrk="0" hangingPunct="1">
-              <a:lnSpc>
-                <a:spcPct val="90000"/>
-              </a:lnSpc>
-              <a:spcBef>
-                <a:spcPts val="500"/>
-              </a:spcBef>
-              <a:buFont typeface="Arial" panose="020B0604020202020204" pitchFamily="34" charset="0"/>
-              <a:buNone/>
-              <a:defRPr sz="2000" kern="1200">
-                <a:solidFill>
-                  <a:schemeClr val="tx1"/>
-                </a:solidFill>
-                <a:latin typeface="+mn-lt"/>
-                <a:ea typeface="+mn-ea"/>
-                <a:cs typeface="+mn-cs"/>
-              </a:defRPr>
-            </a:lvl2pPr>
-            <a:lvl3pPr marL="914400" indent="0" algn="ctr" defTabSz="914400" rtl="0" eaLnBrk="1" latinLnBrk="0" hangingPunct="1">
-              <a:lnSpc>
-                <a:spcPct val="90000"/>
-              </a:lnSpc>
-              <a:spcBef>
-                <a:spcPts val="500"/>
-              </a:spcBef>
-              <a:buFont typeface="Arial" panose="020B0604020202020204" pitchFamily="34" charset="0"/>
-              <a:buNone/>
-              <a:defRPr sz="1800" kern="1200">
-                <a:solidFill>
-                  <a:schemeClr val="tx1"/>
-                </a:solidFill>
-                <a:latin typeface="+mn-lt"/>
-                <a:ea typeface="+mn-ea"/>
-                <a:cs typeface="+mn-cs"/>
-              </a:defRPr>
-            </a:lvl3pPr>
-            <a:lvl4pPr marL="1371600" indent="0" algn="ctr" defTabSz="914400" rtl="0" eaLnBrk="1" latinLnBrk="0" hangingPunct="1">
-              <a:lnSpc>
-                <a:spcPct val="90000"/>
-              </a:lnSpc>
-              <a:spcBef>
-                <a:spcPts val="500"/>
-              </a:spcBef>
-              <a:buFont typeface="Arial" panose="020B0604020202020204" pitchFamily="34" charset="0"/>
-              <a:buNone/>
-              <a:defRPr sz="1600" kern="1200">
-                <a:solidFill>
-                  <a:schemeClr val="tx1"/>
-                </a:solidFill>
-                <a:latin typeface="+mn-lt"/>
-                <a:ea typeface="+mn-ea"/>
-                <a:cs typeface="+mn-cs"/>
-              </a:defRPr>
-            </a:lvl4pPr>
-            <a:lvl5pPr marL="1828800" indent="0" algn="ctr" defTabSz="914400" rtl="0" eaLnBrk="1" latinLnBrk="0" hangingPunct="1">
-              <a:lnSpc>
-                <a:spcPct val="90000"/>
-              </a:lnSpc>
-              <a:spcBef>
-                <a:spcPts val="500"/>
-              </a:spcBef>
-              <a:buFont typeface="Arial" panose="020B0604020202020204" pitchFamily="34" charset="0"/>
-              <a:buNone/>
-              <a:defRPr sz="1600" kern="1200">
-                <a:solidFill>
-                  <a:schemeClr val="tx1"/>
-                </a:solidFill>
-                <a:latin typeface="+mn-lt"/>
-                <a:ea typeface="+mn-ea"/>
-                <a:cs typeface="+mn-cs"/>
-              </a:defRPr>
-            </a:lvl5pPr>
-            <a:lvl6pPr marL="2286000" indent="0" algn="ctr" defTabSz="914400" rtl="0" eaLnBrk="1" latinLnBrk="0" hangingPunct="1">
-              <a:lnSpc>
-                <a:spcPct val="90000"/>
-              </a:lnSpc>
-              <a:spcBef>
-                <a:spcPts val="500"/>
-              </a:spcBef>
-              <a:buFont typeface="Arial" panose="020B0604020202020204" pitchFamily="34" charset="0"/>
-              <a:buNone/>
-              <a:defRPr sz="1600" kern="1200">
-                <a:solidFill>
-                  <a:schemeClr val="tx1"/>
-                </a:solidFill>
-                <a:latin typeface="+mn-lt"/>
-                <a:ea typeface="+mn-ea"/>
-                <a:cs typeface="+mn-cs"/>
-              </a:defRPr>
-            </a:lvl6pPr>
-            <a:lvl7pPr marL="2743200" indent="0" algn="ctr" defTabSz="914400" rtl="0" eaLnBrk="1" latinLnBrk="0" hangingPunct="1">
-              <a:lnSpc>
-                <a:spcPct val="90000"/>
-              </a:lnSpc>
-              <a:spcBef>
-                <a:spcPts val="500"/>
-              </a:spcBef>
-              <a:buFont typeface="Arial" panose="020B0604020202020204" pitchFamily="34" charset="0"/>
-              <a:buNone/>
-              <a:defRPr sz="1600" kern="1200">
-                <a:solidFill>
-                  <a:schemeClr val="tx1"/>
-                </a:solidFill>
-                <a:latin typeface="+mn-lt"/>
-                <a:ea typeface="+mn-ea"/>
-                <a:cs typeface="+mn-cs"/>
-              </a:defRPr>
-            </a:lvl7pPr>
-            <a:lvl8pPr marL="3200400" indent="0" algn="ctr" defTabSz="914400" rtl="0" eaLnBrk="1" latinLnBrk="0" hangingPunct="1">
-              <a:lnSpc>
-                <a:spcPct val="90000"/>
-              </a:lnSpc>
-              <a:spcBef>
-                <a:spcPts val="500"/>
-              </a:spcBef>
-              <a:buFont typeface="Arial" panose="020B0604020202020204" pitchFamily="34" charset="0"/>
-              <a:buNone/>
-              <a:defRPr sz="1600" kern="1200">
-                <a:solidFill>
-                  <a:schemeClr val="tx1"/>
-                </a:solidFill>
-                <a:latin typeface="+mn-lt"/>
-                <a:ea typeface="+mn-ea"/>
-                <a:cs typeface="+mn-cs"/>
-              </a:defRPr>
-            </a:lvl8pPr>
-            <a:lvl9pPr marL="3657600" indent="0" algn="ctr" defTabSz="914400" rtl="0" eaLnBrk="1" latinLnBrk="0" hangingPunct="1">
-              <a:lnSpc>
-                <a:spcPct val="90000"/>
-              </a:lnSpc>
-              <a:spcBef>
-                <a:spcPts val="500"/>
-              </a:spcBef>
-              <a:buFont typeface="Arial" panose="020B0604020202020204" pitchFamily="34" charset="0"/>
-              <a:buNone/>
-              <a:defRPr sz="1600" kern="1200">
-                <a:solidFill>
-                  <a:schemeClr val="tx1"/>
-                </a:solidFill>
-                <a:latin typeface="+mn-lt"/>
-                <a:ea typeface="+mn-ea"/>
-                <a:cs typeface="+mn-cs"/>
-              </a:defRPr>
-            </a:lvl9pPr>
-          </a:lstStyle>
-          <a:p>
-            <a:pPr marL="285750" indent="-285750" algn="l">
-              <a:buFontTx/>
-              <a:buChar char="-"/>
-            </a:pPr>
-            <a:r>
-              <a:rPr lang="en-GB" sz="1800"/>
-              <a:t>JVM understands that the Java program is run when the “main” method is called =&gt; However, the end of “main” method doesn’t indicate the end of an entire program (it depends on what is inside of “main” method)</a:t>
-            </a:r>
-          </a:p>
-          <a:p>
-            <a:pPr marL="285750" indent="-285750" algn="l">
-              <a:buFontTx/>
-              <a:buChar char="-"/>
-            </a:pPr>
-            <a:r>
-              <a:rPr lang="en-GB" sz="1800"/>
-              <a:t>If the Java program is simple with just some printing things and looping things =&gt; the end of “main” method is the end of the entire program since there are nothing else to do</a:t>
-            </a:r>
-          </a:p>
-          <a:p>
-            <a:pPr marL="285750" indent="-285750" algn="l">
-              <a:buFontTx/>
-              <a:buChar char="-"/>
-            </a:pPr>
-            <a:r>
-              <a:rPr lang="en-GB" sz="1800"/>
-              <a:t>However, Java program is a combination of many classes interact with each other =&gt; the “main” method is where each object of each class is created and their method would be called and interact further =&gt; the “main” method could reach to the end, but, the program doesn’t since the interaction between the objects created from “main” hasn’ stopped yet</a:t>
-            </a:r>
-          </a:p>
-          <a:p>
-            <a:pPr marL="285750" indent="-285750" algn="l">
-              <a:buFontTx/>
-              <a:buChar char="-"/>
-            </a:pPr>
-            <a:r>
-              <a:rPr lang="en-GB" sz="1800" i="1"/>
-              <a:t>E.g: Java FileIO APIs (file opening and closing even after the “main” method has reached the end” )</a:t>
-            </a:r>
-          </a:p>
-          <a:p>
-            <a:pPr marL="285750" indent="-285750" algn="l">
-              <a:buFontTx/>
-              <a:buChar char="-"/>
-            </a:pPr>
-            <a:endParaRPr lang="en-GB" sz="1000" i="1"/>
-          </a:p>
-        </p:txBody>
-      </p:sp>
-      <p:sp>
-        <p:nvSpPr>
-          <p:cNvPr id="5" name="Subtitle 2">
-            <a:extLst>
-              <a:ext uri="{FF2B5EF4-FFF2-40B4-BE49-F238E27FC236}">
-                <a16:creationId xmlns:a16="http://schemas.microsoft.com/office/drawing/2014/main" id="{BBA13038-CAB8-FCA0-CDE8-65E40C2F10A3}"/>
-              </a:ext>
-            </a:extLst>
-          </p:cNvPr>
-          <p:cNvSpPr txBox="1">
-            <a:spLocks/>
-          </p:cNvSpPr>
-          <p:nvPr/>
-        </p:nvSpPr>
-        <p:spPr>
-          <a:xfrm>
-            <a:off x="1835150" y="3429000"/>
-            <a:ext cx="9137650" cy="2400657"/>
-          </a:xfrm>
-          <a:prstGeom prst="rect">
-            <a:avLst/>
-          </a:prstGeom>
-        </p:spPr>
-        <p:txBody>
-          <a:bodyPr vert="horz" lIns="91440" tIns="45720" rIns="91440" bIns="45720" rtlCol="0">
-            <a:normAutofit/>
-          </a:bodyPr>
-          <a:lstStyle>
-            <a:lvl1pPr marL="0" indent="0" algn="ctr" defTabSz="914400" rtl="0" eaLnBrk="1" latinLnBrk="0" hangingPunct="1">
-              <a:lnSpc>
-                <a:spcPct val="90000"/>
-              </a:lnSpc>
-              <a:spcBef>
-                <a:spcPts val="1000"/>
-              </a:spcBef>
-              <a:buFont typeface="Arial" panose="020B0604020202020204" pitchFamily="34" charset="0"/>
-              <a:buNone/>
-              <a:defRPr sz="2400" kern="1200">
-                <a:solidFill>
-                  <a:schemeClr val="tx1"/>
-                </a:solidFill>
-                <a:latin typeface="+mn-lt"/>
-                <a:ea typeface="+mn-ea"/>
-                <a:cs typeface="+mn-cs"/>
-              </a:defRPr>
-            </a:lvl1pPr>
-            <a:lvl2pPr marL="457200" indent="0" algn="ctr" defTabSz="914400" rtl="0" eaLnBrk="1" latinLnBrk="0" hangingPunct="1">
-              <a:lnSpc>
-                <a:spcPct val="90000"/>
-              </a:lnSpc>
-              <a:spcBef>
-                <a:spcPts val="500"/>
-              </a:spcBef>
-              <a:buFont typeface="Arial" panose="020B0604020202020204" pitchFamily="34" charset="0"/>
-              <a:buNone/>
-              <a:defRPr sz="2000" kern="1200">
-                <a:solidFill>
-                  <a:schemeClr val="tx1"/>
-                </a:solidFill>
-                <a:latin typeface="+mn-lt"/>
-                <a:ea typeface="+mn-ea"/>
-                <a:cs typeface="+mn-cs"/>
-              </a:defRPr>
-            </a:lvl2pPr>
-            <a:lvl3pPr marL="914400" indent="0" algn="ctr" defTabSz="914400" rtl="0" eaLnBrk="1" latinLnBrk="0" hangingPunct="1">
-              <a:lnSpc>
-                <a:spcPct val="90000"/>
-              </a:lnSpc>
-              <a:spcBef>
-                <a:spcPts val="500"/>
-              </a:spcBef>
-              <a:buFont typeface="Arial" panose="020B0604020202020204" pitchFamily="34" charset="0"/>
-              <a:buNone/>
-              <a:defRPr sz="1800" kern="1200">
-                <a:solidFill>
-                  <a:schemeClr val="tx1"/>
-                </a:solidFill>
-                <a:latin typeface="+mn-lt"/>
-                <a:ea typeface="+mn-ea"/>
-                <a:cs typeface="+mn-cs"/>
-              </a:defRPr>
-            </a:lvl3pPr>
-            <a:lvl4pPr marL="1371600" indent="0" algn="ctr" defTabSz="914400" rtl="0" eaLnBrk="1" latinLnBrk="0" hangingPunct="1">
-              <a:lnSpc>
-                <a:spcPct val="90000"/>
-              </a:lnSpc>
-              <a:spcBef>
-                <a:spcPts val="500"/>
-              </a:spcBef>
-              <a:buFont typeface="Arial" panose="020B0604020202020204" pitchFamily="34" charset="0"/>
-              <a:buNone/>
-              <a:defRPr sz="1600" kern="1200">
-                <a:solidFill>
-                  <a:schemeClr val="tx1"/>
-                </a:solidFill>
-                <a:latin typeface="+mn-lt"/>
-                <a:ea typeface="+mn-ea"/>
-                <a:cs typeface="+mn-cs"/>
-              </a:defRPr>
-            </a:lvl4pPr>
-            <a:lvl5pPr marL="1828800" indent="0" algn="ctr" defTabSz="914400" rtl="0" eaLnBrk="1" latinLnBrk="0" hangingPunct="1">
-              <a:lnSpc>
-                <a:spcPct val="90000"/>
-              </a:lnSpc>
-              <a:spcBef>
-                <a:spcPts val="500"/>
-              </a:spcBef>
-              <a:buFont typeface="Arial" panose="020B0604020202020204" pitchFamily="34" charset="0"/>
-              <a:buNone/>
-              <a:defRPr sz="1600" kern="1200">
-                <a:solidFill>
-                  <a:schemeClr val="tx1"/>
-                </a:solidFill>
-                <a:latin typeface="+mn-lt"/>
-                <a:ea typeface="+mn-ea"/>
-                <a:cs typeface="+mn-cs"/>
-              </a:defRPr>
-            </a:lvl5pPr>
-            <a:lvl6pPr marL="2286000" indent="0" algn="ctr" defTabSz="914400" rtl="0" eaLnBrk="1" latinLnBrk="0" hangingPunct="1">
-              <a:lnSpc>
-                <a:spcPct val="90000"/>
-              </a:lnSpc>
-              <a:spcBef>
-                <a:spcPts val="500"/>
-              </a:spcBef>
-              <a:buFont typeface="Arial" panose="020B0604020202020204" pitchFamily="34" charset="0"/>
-              <a:buNone/>
-              <a:defRPr sz="1600" kern="1200">
-                <a:solidFill>
-                  <a:schemeClr val="tx1"/>
-                </a:solidFill>
-                <a:latin typeface="+mn-lt"/>
-                <a:ea typeface="+mn-ea"/>
-                <a:cs typeface="+mn-cs"/>
-              </a:defRPr>
-            </a:lvl6pPr>
-            <a:lvl7pPr marL="2743200" indent="0" algn="ctr" defTabSz="914400" rtl="0" eaLnBrk="1" latinLnBrk="0" hangingPunct="1">
-              <a:lnSpc>
-                <a:spcPct val="90000"/>
-              </a:lnSpc>
-              <a:spcBef>
-                <a:spcPts val="500"/>
-              </a:spcBef>
-              <a:buFont typeface="Arial" panose="020B0604020202020204" pitchFamily="34" charset="0"/>
-              <a:buNone/>
-              <a:defRPr sz="1600" kern="1200">
-                <a:solidFill>
-                  <a:schemeClr val="tx1"/>
-                </a:solidFill>
-                <a:latin typeface="+mn-lt"/>
-                <a:ea typeface="+mn-ea"/>
-                <a:cs typeface="+mn-cs"/>
-              </a:defRPr>
-            </a:lvl7pPr>
-            <a:lvl8pPr marL="3200400" indent="0" algn="ctr" defTabSz="914400" rtl="0" eaLnBrk="1" latinLnBrk="0" hangingPunct="1">
-              <a:lnSpc>
-                <a:spcPct val="90000"/>
-              </a:lnSpc>
-              <a:spcBef>
-                <a:spcPts val="500"/>
-              </a:spcBef>
-              <a:buFont typeface="Arial" panose="020B0604020202020204" pitchFamily="34" charset="0"/>
-              <a:buNone/>
-              <a:defRPr sz="1600" kern="1200">
-                <a:solidFill>
-                  <a:schemeClr val="tx1"/>
-                </a:solidFill>
-                <a:latin typeface="+mn-lt"/>
-                <a:ea typeface="+mn-ea"/>
-                <a:cs typeface="+mn-cs"/>
-              </a:defRPr>
-            </a:lvl8pPr>
-            <a:lvl9pPr marL="3657600" indent="0" algn="ctr" defTabSz="914400" rtl="0" eaLnBrk="1" latinLnBrk="0" hangingPunct="1">
-              <a:lnSpc>
-                <a:spcPct val="90000"/>
-              </a:lnSpc>
-              <a:spcBef>
-                <a:spcPts val="500"/>
-              </a:spcBef>
-              <a:buFont typeface="Arial" panose="020B0604020202020204" pitchFamily="34" charset="0"/>
-              <a:buNone/>
-              <a:defRPr sz="1600" kern="1200">
-                <a:solidFill>
-                  <a:schemeClr val="tx1"/>
-                </a:solidFill>
-                <a:latin typeface="+mn-lt"/>
-                <a:ea typeface="+mn-ea"/>
-                <a:cs typeface="+mn-cs"/>
-              </a:defRPr>
-            </a:lvl9pPr>
-          </a:lstStyle>
-          <a:p>
-            <a:pPr marL="285750" indent="-285750" algn="l">
-              <a:buFontTx/>
-              <a:buChar char="-"/>
-            </a:pPr>
-            <a:endParaRPr lang="en-GB" sz="1000" i="1"/>
-          </a:p>
-        </p:txBody>
-      </p:sp>
-      <p:sp>
-        <p:nvSpPr>
-          <p:cNvPr id="7" name="Subtitle 2">
-            <a:extLst>
-              <a:ext uri="{FF2B5EF4-FFF2-40B4-BE49-F238E27FC236}">
-                <a16:creationId xmlns:a16="http://schemas.microsoft.com/office/drawing/2014/main" id="{735C0034-9699-F9D9-6534-306539359175}"/>
-              </a:ext>
-            </a:extLst>
-          </p:cNvPr>
-          <p:cNvSpPr txBox="1">
-            <a:spLocks/>
-          </p:cNvSpPr>
-          <p:nvPr/>
-        </p:nvSpPr>
-        <p:spPr>
-          <a:xfrm>
-            <a:off x="0" y="2028102"/>
-            <a:ext cx="12192000" cy="4829898"/>
-          </a:xfrm>
-          <a:prstGeom prst="rect">
-            <a:avLst/>
-          </a:prstGeom>
-        </p:spPr>
-        <p:txBody>
-          <a:bodyPr vert="horz" lIns="91440" tIns="45720" rIns="91440" bIns="45720" rtlCol="0">
-            <a:normAutofit/>
-          </a:bodyPr>
-          <a:lstStyle>
-            <a:lvl1pPr marL="0" indent="0" algn="ctr" defTabSz="914400" rtl="0" eaLnBrk="1" latinLnBrk="0" hangingPunct="1">
-              <a:lnSpc>
-                <a:spcPct val="90000"/>
-              </a:lnSpc>
-              <a:spcBef>
-                <a:spcPts val="1000"/>
-              </a:spcBef>
-              <a:buFont typeface="Arial" panose="020B0604020202020204" pitchFamily="34" charset="0"/>
-              <a:buNone/>
-              <a:defRPr sz="2400" kern="1200">
-                <a:solidFill>
-                  <a:schemeClr val="tx1"/>
-                </a:solidFill>
-                <a:latin typeface="+mn-lt"/>
-                <a:ea typeface="+mn-ea"/>
-                <a:cs typeface="+mn-cs"/>
-              </a:defRPr>
-            </a:lvl1pPr>
-            <a:lvl2pPr marL="457200" indent="0" algn="ctr" defTabSz="914400" rtl="0" eaLnBrk="1" latinLnBrk="0" hangingPunct="1">
-              <a:lnSpc>
-                <a:spcPct val="90000"/>
-              </a:lnSpc>
-              <a:spcBef>
-                <a:spcPts val="500"/>
-              </a:spcBef>
-              <a:buFont typeface="Arial" panose="020B0604020202020204" pitchFamily="34" charset="0"/>
-              <a:buNone/>
-              <a:defRPr sz="2000" kern="1200">
-                <a:solidFill>
-                  <a:schemeClr val="tx1"/>
-                </a:solidFill>
-                <a:latin typeface="+mn-lt"/>
-                <a:ea typeface="+mn-ea"/>
-                <a:cs typeface="+mn-cs"/>
-              </a:defRPr>
-            </a:lvl2pPr>
-            <a:lvl3pPr marL="914400" indent="0" algn="ctr" defTabSz="914400" rtl="0" eaLnBrk="1" latinLnBrk="0" hangingPunct="1">
-              <a:lnSpc>
-                <a:spcPct val="90000"/>
-              </a:lnSpc>
-              <a:spcBef>
-                <a:spcPts val="500"/>
-              </a:spcBef>
-              <a:buFont typeface="Arial" panose="020B0604020202020204" pitchFamily="34" charset="0"/>
-              <a:buNone/>
-              <a:defRPr sz="1800" kern="1200">
-                <a:solidFill>
-                  <a:schemeClr val="tx1"/>
-                </a:solidFill>
-                <a:latin typeface="+mn-lt"/>
-                <a:ea typeface="+mn-ea"/>
-                <a:cs typeface="+mn-cs"/>
-              </a:defRPr>
-            </a:lvl3pPr>
-            <a:lvl4pPr marL="1371600" indent="0" algn="ctr" defTabSz="914400" rtl="0" eaLnBrk="1" latinLnBrk="0" hangingPunct="1">
-              <a:lnSpc>
-                <a:spcPct val="90000"/>
-              </a:lnSpc>
-              <a:spcBef>
-                <a:spcPts val="500"/>
-              </a:spcBef>
-              <a:buFont typeface="Arial" panose="020B0604020202020204" pitchFamily="34" charset="0"/>
-              <a:buNone/>
-              <a:defRPr sz="1600" kern="1200">
-                <a:solidFill>
-                  <a:schemeClr val="tx1"/>
-                </a:solidFill>
-                <a:latin typeface="+mn-lt"/>
-                <a:ea typeface="+mn-ea"/>
-                <a:cs typeface="+mn-cs"/>
-              </a:defRPr>
-            </a:lvl4pPr>
-            <a:lvl5pPr marL="1828800" indent="0" algn="ctr" defTabSz="914400" rtl="0" eaLnBrk="1" latinLnBrk="0" hangingPunct="1">
-              <a:lnSpc>
-                <a:spcPct val="90000"/>
-              </a:lnSpc>
-              <a:spcBef>
-                <a:spcPts val="500"/>
-              </a:spcBef>
-              <a:buFont typeface="Arial" panose="020B0604020202020204" pitchFamily="34" charset="0"/>
-              <a:buNone/>
-              <a:defRPr sz="1600" kern="1200">
-                <a:solidFill>
-                  <a:schemeClr val="tx1"/>
-                </a:solidFill>
-                <a:latin typeface="+mn-lt"/>
-                <a:ea typeface="+mn-ea"/>
-                <a:cs typeface="+mn-cs"/>
-              </a:defRPr>
-            </a:lvl5pPr>
-            <a:lvl6pPr marL="2286000" indent="0" algn="ctr" defTabSz="914400" rtl="0" eaLnBrk="1" latinLnBrk="0" hangingPunct="1">
-              <a:lnSpc>
-                <a:spcPct val="90000"/>
-              </a:lnSpc>
-              <a:spcBef>
-                <a:spcPts val="500"/>
-              </a:spcBef>
-              <a:buFont typeface="Arial" panose="020B0604020202020204" pitchFamily="34" charset="0"/>
-              <a:buNone/>
-              <a:defRPr sz="1600" kern="1200">
-                <a:solidFill>
-                  <a:schemeClr val="tx1"/>
-                </a:solidFill>
-                <a:latin typeface="+mn-lt"/>
-                <a:ea typeface="+mn-ea"/>
-                <a:cs typeface="+mn-cs"/>
-              </a:defRPr>
-            </a:lvl6pPr>
-            <a:lvl7pPr marL="2743200" indent="0" algn="ctr" defTabSz="914400" rtl="0" eaLnBrk="1" latinLnBrk="0" hangingPunct="1">
-              <a:lnSpc>
-                <a:spcPct val="90000"/>
-              </a:lnSpc>
-              <a:spcBef>
-                <a:spcPts val="500"/>
-              </a:spcBef>
-              <a:buFont typeface="Arial" panose="020B0604020202020204" pitchFamily="34" charset="0"/>
-              <a:buNone/>
-              <a:defRPr sz="1600" kern="1200">
-                <a:solidFill>
-                  <a:schemeClr val="tx1"/>
-                </a:solidFill>
-                <a:latin typeface="+mn-lt"/>
-                <a:ea typeface="+mn-ea"/>
-                <a:cs typeface="+mn-cs"/>
-              </a:defRPr>
-            </a:lvl7pPr>
-            <a:lvl8pPr marL="3200400" indent="0" algn="ctr" defTabSz="914400" rtl="0" eaLnBrk="1" latinLnBrk="0" hangingPunct="1">
-              <a:lnSpc>
-                <a:spcPct val="90000"/>
-              </a:lnSpc>
-              <a:spcBef>
-                <a:spcPts val="500"/>
-              </a:spcBef>
-              <a:buFont typeface="Arial" panose="020B0604020202020204" pitchFamily="34" charset="0"/>
-              <a:buNone/>
-              <a:defRPr sz="1600" kern="1200">
-                <a:solidFill>
-                  <a:schemeClr val="tx1"/>
-                </a:solidFill>
-                <a:latin typeface="+mn-lt"/>
-                <a:ea typeface="+mn-ea"/>
-                <a:cs typeface="+mn-cs"/>
-              </a:defRPr>
-            </a:lvl8pPr>
-            <a:lvl9pPr marL="3657600" indent="0" algn="ctr" defTabSz="914400" rtl="0" eaLnBrk="1" latinLnBrk="0" hangingPunct="1">
-              <a:lnSpc>
-                <a:spcPct val="90000"/>
-              </a:lnSpc>
-              <a:spcBef>
-                <a:spcPts val="500"/>
-              </a:spcBef>
-              <a:buFont typeface="Arial" panose="020B0604020202020204" pitchFamily="34" charset="0"/>
-              <a:buNone/>
-              <a:defRPr sz="1600" kern="1200">
-                <a:solidFill>
-                  <a:schemeClr val="tx1"/>
-                </a:solidFill>
-                <a:latin typeface="+mn-lt"/>
-                <a:ea typeface="+mn-ea"/>
-                <a:cs typeface="+mn-cs"/>
-              </a:defRPr>
-            </a:lvl9pPr>
-          </a:lstStyle>
-          <a:p>
-            <a:pPr marL="285750" indent="-285750" algn="l">
-              <a:buFontTx/>
-              <a:buChar char="-"/>
-            </a:pPr>
-            <a:endParaRPr lang="en-GB" sz="1800"/>
-          </a:p>
-          <a:p>
-            <a:pPr marL="285750" indent="-285750" algn="l">
-              <a:buFontTx/>
-              <a:buChar char="-"/>
-            </a:pPr>
-            <a:endParaRPr lang="en-GB" sz="1000" i="1"/>
-          </a:p>
-        </p:txBody>
-      </p:sp>
-    </p:spTree>
-    <p:extLst>
-      <p:ext uri="{BB962C8B-B14F-4D97-AF65-F5344CB8AC3E}">
-        <p14:creationId xmlns:p14="http://schemas.microsoft.com/office/powerpoint/2010/main" val="1570693514"/>
-      </p:ext>
-    </p:extLst>
-  </p:cSld>
-  <p:clrMapOvr>
-    <a:masterClrMapping/>
-  </p:clrMapOvr>
-  <p:timing>
-    <p:tnLst>
-      <p:par>
-        <p:cTn id="1" dur="indefinite" restart="never" nodeType="tmRoot">
-          <p:childTnLst>
-            <p:seq concurrent="1" nextAc="seek">
-              <p:cTn id="2" dur="indefinite" nodeType="mainSeq">
-                <p:childTnLst>
-                  <p:par>
-                    <p:cTn id="3" fill="hold">
-                      <p:stCondLst>
-                        <p:cond delay="indefinite"/>
-                      </p:stCondLst>
-                      <p:childTnLst>
-                        <p:par>
-                          <p:cTn id="4" fill="hold">
-                            <p:stCondLst>
-                              <p:cond delay="0"/>
-                            </p:stCondLst>
-                            <p:childTnLst>
-                              <p:par>
-                                <p:cTn id="5" presetID="1" presetClass="entr" presetSubtype="0" fill="hold" nodeType="clickEffect">
-                                  <p:stCondLst>
-                                    <p:cond delay="0"/>
-                                  </p:stCondLst>
-                                  <p:childTnLst>
-                                    <p:set>
-                                      <p:cBhvr>
-                                        <p:cTn id="6" dur="1" fill="hold">
-                                          <p:stCondLst>
-                                            <p:cond delay="0"/>
-                                          </p:stCondLst>
-                                        </p:cTn>
-                                        <p:tgtEl>
-                                          <p:spTgt spid="4">
-                                            <p:txEl>
-                                              <p:pRg st="0" end="0"/>
-                                            </p:txEl>
-                                          </p:spTgt>
-                                        </p:tgtEl>
-                                        <p:attrNameLst>
-                                          <p:attrName>style.visibility</p:attrName>
-                                        </p:attrNameLst>
-                                      </p:cBhvr>
-                                      <p:to>
-                                        <p:strVal val="visible"/>
-                                      </p:to>
-                                    </p:set>
-                                  </p:childTnLst>
-                                </p:cTn>
-                              </p:par>
-                            </p:childTnLst>
-                          </p:cTn>
-                        </p:par>
-                      </p:childTnLst>
-                    </p:cTn>
-                  </p:par>
-                  <p:par>
-                    <p:cTn id="7" fill="hold">
-                      <p:stCondLst>
-                        <p:cond delay="indefinite"/>
-                      </p:stCondLst>
-                      <p:childTnLst>
-                        <p:par>
-                          <p:cTn id="8" fill="hold">
-                            <p:stCondLst>
-                              <p:cond delay="0"/>
-                            </p:stCondLst>
-                            <p:childTnLst>
-                              <p:par>
-                                <p:cTn id="9" presetID="1" presetClass="entr" presetSubtype="0" fill="hold" nodeType="clickEffect">
-                                  <p:stCondLst>
-                                    <p:cond delay="0"/>
-                                  </p:stCondLst>
-                                  <p:childTnLst>
-                                    <p:set>
-                                      <p:cBhvr>
-                                        <p:cTn id="10" dur="1" fill="hold">
-                                          <p:stCondLst>
-                                            <p:cond delay="0"/>
-                                          </p:stCondLst>
-                                        </p:cTn>
-                                        <p:tgtEl>
-                                          <p:spTgt spid="4">
-                                            <p:txEl>
-                                              <p:pRg st="1" end="1"/>
-                                            </p:txEl>
-                                          </p:spTgt>
-                                        </p:tgtEl>
-                                        <p:attrNameLst>
-                                          <p:attrName>style.visibility</p:attrName>
-                                        </p:attrNameLst>
-                                      </p:cBhvr>
-                                      <p:to>
-                                        <p:strVal val="visible"/>
-                                      </p:to>
-                                    </p:set>
-                                  </p:childTnLst>
-                                </p:cTn>
-                              </p:par>
-                            </p:childTnLst>
-                          </p:cTn>
-                        </p:par>
-                      </p:childTnLst>
-                    </p:cTn>
-                  </p:par>
-                  <p:par>
-                    <p:cTn id="11" fill="hold">
-                      <p:stCondLst>
-                        <p:cond delay="indefinite"/>
-                      </p:stCondLst>
-                      <p:childTnLst>
-                        <p:par>
-                          <p:cTn id="12" fill="hold">
-                            <p:stCondLst>
-                              <p:cond delay="0"/>
-                            </p:stCondLst>
-                            <p:childTnLst>
-                              <p:par>
-                                <p:cTn id="13" presetID="1" presetClass="entr" presetSubtype="0" fill="hold" nodeType="clickEffect">
-                                  <p:stCondLst>
-                                    <p:cond delay="0"/>
-                                  </p:stCondLst>
-                                  <p:childTnLst>
-                                    <p:set>
-                                      <p:cBhvr>
-                                        <p:cTn id="14" dur="1" fill="hold">
-                                          <p:stCondLst>
-                                            <p:cond delay="0"/>
-                                          </p:stCondLst>
-                                        </p:cTn>
-                                        <p:tgtEl>
-                                          <p:spTgt spid="4">
-                                            <p:txEl>
-                                              <p:pRg st="2" end="2"/>
-                                            </p:txEl>
-                                          </p:spTgt>
-                                        </p:tgtEl>
-                                        <p:attrNameLst>
-                                          <p:attrName>style.visibility</p:attrName>
-                                        </p:attrNameLst>
-                                      </p:cBhvr>
-                                      <p:to>
-                                        <p:strVal val="visible"/>
-                                      </p:to>
-                                    </p:set>
-                                  </p:childTnLst>
-                                </p:cTn>
-                              </p:par>
-                            </p:childTnLst>
-                          </p:cTn>
-                        </p:par>
-                      </p:childTnLst>
-                    </p:cTn>
-                  </p:par>
-                  <p:par>
-                    <p:cTn id="15" fill="hold">
-                      <p:stCondLst>
-                        <p:cond delay="indefinite"/>
-                      </p:stCondLst>
-                      <p:childTnLst>
-                        <p:par>
-                          <p:cTn id="16" fill="hold">
-                            <p:stCondLst>
-                              <p:cond delay="0"/>
-                            </p:stCondLst>
-                            <p:childTnLst>
-                              <p:par>
-                                <p:cTn id="17" presetID="1" presetClass="entr" presetSubtype="0" fill="hold" nodeType="clickEffect">
-                                  <p:stCondLst>
-                                    <p:cond delay="0"/>
-                                  </p:stCondLst>
-                                  <p:childTnLst>
-                                    <p:set>
-                                      <p:cBhvr>
-                                        <p:cTn id="18" dur="1" fill="hold">
-                                          <p:stCondLst>
-                                            <p:cond delay="0"/>
-                                          </p:stCondLst>
-                                        </p:cTn>
-                                        <p:tgtEl>
-                                          <p:spTgt spid="4">
-                                            <p:txEl>
-                                              <p:pRg st="3" end="3"/>
-                                            </p:txEl>
-                                          </p:spTgt>
-                                        </p:tgtEl>
-                                        <p:attrNameLst>
-                                          <p:attrName>style.visibility</p:attrName>
-                                        </p:attrNameLst>
-                                      </p:cBhvr>
-                                      <p:to>
-                                        <p:strVal val="visible"/>
-                                      </p:to>
-                                    </p:set>
-                                  </p:childTnLst>
-                                </p:cTn>
-                              </p:par>
-                            </p:childTnLst>
-                          </p:cTn>
-                        </p:par>
-                      </p:childTnLst>
-                    </p:cTn>
-                  </p:par>
-                </p:childTnLst>
-              </p:cTn>
-              <p:prevCondLst>
-                <p:cond evt="onPrev" delay="0">
-                  <p:tgtEl>
-                    <p:sldTgt/>
-                  </p:tgtEl>
-                </p:cond>
-              </p:prevCondLst>
-              <p:nextCondLst>
-                <p:cond evt="onNext" delay="0">
-                  <p:tgtEl>
-                    <p:sldTgt/>
-                  </p:tgtEl>
-                </p:cond>
-              </p:nextCondLst>
-            </p:seq>
-          </p:childTnLst>
-        </p:cTn>
-      </p:par>
-    </p:tnLst>
-  </p:timing>
-</p:sld>
-</file>
-
-<file path=ppt/slides/slide8.xml><?xml version="1.0" encoding="utf-8"?>
-<p:sld xmlns:a="http://schemas.openxmlformats.org/drawingml/2006/main" xmlns:r="http://schemas.openxmlformats.org/officeDocument/2006/relationships" xmlns:p="http://schemas.openxmlformats.org/presentationml/2006/main">
-  <p:cSld>
-    <p:spTree>
-      <p:nvGrpSpPr>
-        <p:cNvPr id="1" name=""/>
-        <p:cNvGrpSpPr/>
-        <p:nvPr/>
-      </p:nvGrpSpPr>
-      <p:grpSpPr>
-        <a:xfrm>
-          <a:off x="0" y="0"/>
-          <a:ext cx="0" cy="0"/>
-          <a:chOff x="0" y="0"/>
-          <a:chExt cx="0" cy="0"/>
-        </a:xfrm>
-      </p:grpSpPr>
-      <p:sp>
-        <p:nvSpPr>
-          <p:cNvPr id="3" name="Subtitle 2">
-            <a:extLst>
-              <a:ext uri="{FF2B5EF4-FFF2-40B4-BE49-F238E27FC236}">
-                <a16:creationId xmlns:a16="http://schemas.microsoft.com/office/drawing/2014/main" id="{96DD8BC4-D539-661E-8A88-53AF6C208F93}"/>
-              </a:ext>
-            </a:extLst>
-          </p:cNvPr>
-          <p:cNvSpPr>
-            <a:spLocks noGrp="1"/>
-          </p:cNvSpPr>
-          <p:nvPr>
-            <p:ph type="subTitle" idx="1"/>
-          </p:nvPr>
-        </p:nvSpPr>
-        <p:spPr>
-          <a:xfrm>
-            <a:off x="152400" y="217488"/>
-            <a:ext cx="6686550" cy="303212"/>
-          </a:xfrm>
-        </p:spPr>
-        <p:txBody>
-          <a:bodyPr>
             <a:normAutofit fontScale="92500" lnSpcReduction="20000"/>
           </a:bodyPr>
           <a:lstStyle/>
@@ -12466,7 +10580,7 @@
 </p:sld>
 </file>
 
-<file path=ppt/slides/slide9.xml><?xml version="1.0" encoding="utf-8"?>
+<file path=ppt/slides/slide8.xml><?xml version="1.0" encoding="utf-8"?>
 <p:sld xmlns:a="http://schemas.openxmlformats.org/drawingml/2006/main" xmlns:r="http://schemas.openxmlformats.org/officeDocument/2006/relationships" xmlns:p="http://schemas.openxmlformats.org/presentationml/2006/main">
   <p:cSld>
     <p:spTree>
@@ -13896,6 +12010,947 @@
       </p:par>
     </p:tnLst>
   </p:timing>
+</p:sld>
+</file>
+
+<file path=ppt/slides/slide9.xml><?xml version="1.0" encoding="utf-8"?>
+<p:sld xmlns:a="http://schemas.openxmlformats.org/drawingml/2006/main" xmlns:r="http://schemas.openxmlformats.org/officeDocument/2006/relationships" xmlns:p="http://schemas.openxmlformats.org/presentationml/2006/main">
+  <p:cSld>
+    <p:spTree>
+      <p:nvGrpSpPr>
+        <p:cNvPr id="1" name=""/>
+        <p:cNvGrpSpPr/>
+        <p:nvPr/>
+      </p:nvGrpSpPr>
+      <p:grpSpPr>
+        <a:xfrm>
+          <a:off x="0" y="0"/>
+          <a:ext cx="0" cy="0"/>
+          <a:chOff x="0" y="0"/>
+          <a:chExt cx="0" cy="0"/>
+        </a:xfrm>
+      </p:grpSpPr>
+      <p:sp>
+        <p:nvSpPr>
+          <p:cNvPr id="3" name="Subtitle 2">
+            <a:extLst>
+              <a:ext uri="{FF2B5EF4-FFF2-40B4-BE49-F238E27FC236}">
+                <a16:creationId xmlns:a16="http://schemas.microsoft.com/office/drawing/2014/main" id="{96DD8BC4-D539-661E-8A88-53AF6C208F93}"/>
+              </a:ext>
+            </a:extLst>
+          </p:cNvPr>
+          <p:cNvSpPr>
+            <a:spLocks noGrp="1"/>
+          </p:cNvSpPr>
+          <p:nvPr>
+            <p:ph type="subTitle" idx="1"/>
+          </p:nvPr>
+        </p:nvSpPr>
+        <p:spPr>
+          <a:xfrm>
+            <a:off x="152400" y="217488"/>
+            <a:ext cx="6686550" cy="303212"/>
+          </a:xfrm>
+        </p:spPr>
+        <p:txBody>
+          <a:bodyPr>
+            <a:normAutofit fontScale="92500" lnSpcReduction="20000"/>
+          </a:bodyPr>
+          <a:lstStyle/>
+          <a:p>
+            <a:r>
+              <a:rPr lang="en-US" sz="1800"/>
+              <a:t>3.6 Object-Oriented Programming: </a:t>
+            </a:r>
+            <a:r>
+              <a:rPr lang="en-US" sz="1800" b="1" i="1"/>
+              <a:t>3.6.4 – OOP in Java</a:t>
+            </a:r>
+          </a:p>
+        </p:txBody>
+      </p:sp>
+      <p:sp>
+        <p:nvSpPr>
+          <p:cNvPr id="4" name="Subtitle 2">
+            <a:extLst>
+              <a:ext uri="{FF2B5EF4-FFF2-40B4-BE49-F238E27FC236}">
+                <a16:creationId xmlns:a16="http://schemas.microsoft.com/office/drawing/2014/main" id="{BBA13038-CAB8-FCA0-CDE8-65E40C2F10A3}"/>
+              </a:ext>
+            </a:extLst>
+          </p:cNvPr>
+          <p:cNvSpPr txBox="1">
+            <a:spLocks/>
+          </p:cNvSpPr>
+          <p:nvPr/>
+        </p:nvSpPr>
+        <p:spPr>
+          <a:xfrm>
+            <a:off x="0" y="820738"/>
+            <a:ext cx="12192000" cy="6037262"/>
+          </a:xfrm>
+          <a:prstGeom prst="rect">
+            <a:avLst/>
+          </a:prstGeom>
+        </p:spPr>
+        <p:txBody>
+          <a:bodyPr vert="horz" lIns="91440" tIns="45720" rIns="91440" bIns="45720" rtlCol="0">
+            <a:normAutofit/>
+          </a:bodyPr>
+          <a:lstStyle>
+            <a:lvl1pPr marL="0" indent="0" algn="ctr" defTabSz="914400" rtl="0" eaLnBrk="1" latinLnBrk="0" hangingPunct="1">
+              <a:lnSpc>
+                <a:spcPct val="90000"/>
+              </a:lnSpc>
+              <a:spcBef>
+                <a:spcPts val="1000"/>
+              </a:spcBef>
+              <a:buFont typeface="Arial" panose="020B0604020202020204" pitchFamily="34" charset="0"/>
+              <a:buNone/>
+              <a:defRPr sz="2400" kern="1200">
+                <a:solidFill>
+                  <a:schemeClr val="tx1"/>
+                </a:solidFill>
+                <a:latin typeface="+mn-lt"/>
+                <a:ea typeface="+mn-ea"/>
+                <a:cs typeface="+mn-cs"/>
+              </a:defRPr>
+            </a:lvl1pPr>
+            <a:lvl2pPr marL="457200" indent="0" algn="ctr" defTabSz="914400" rtl="0" eaLnBrk="1" latinLnBrk="0" hangingPunct="1">
+              <a:lnSpc>
+                <a:spcPct val="90000"/>
+              </a:lnSpc>
+              <a:spcBef>
+                <a:spcPts val="500"/>
+              </a:spcBef>
+              <a:buFont typeface="Arial" panose="020B0604020202020204" pitchFamily="34" charset="0"/>
+              <a:buNone/>
+              <a:defRPr sz="2000" kern="1200">
+                <a:solidFill>
+                  <a:schemeClr val="tx1"/>
+                </a:solidFill>
+                <a:latin typeface="+mn-lt"/>
+                <a:ea typeface="+mn-ea"/>
+                <a:cs typeface="+mn-cs"/>
+              </a:defRPr>
+            </a:lvl2pPr>
+            <a:lvl3pPr marL="914400" indent="0" algn="ctr" defTabSz="914400" rtl="0" eaLnBrk="1" latinLnBrk="0" hangingPunct="1">
+              <a:lnSpc>
+                <a:spcPct val="90000"/>
+              </a:lnSpc>
+              <a:spcBef>
+                <a:spcPts val="500"/>
+              </a:spcBef>
+              <a:buFont typeface="Arial" panose="020B0604020202020204" pitchFamily="34" charset="0"/>
+              <a:buNone/>
+              <a:defRPr sz="1800" kern="1200">
+                <a:solidFill>
+                  <a:schemeClr val="tx1"/>
+                </a:solidFill>
+                <a:latin typeface="+mn-lt"/>
+                <a:ea typeface="+mn-ea"/>
+                <a:cs typeface="+mn-cs"/>
+              </a:defRPr>
+            </a:lvl3pPr>
+            <a:lvl4pPr marL="1371600" indent="0" algn="ctr" defTabSz="914400" rtl="0" eaLnBrk="1" latinLnBrk="0" hangingPunct="1">
+              <a:lnSpc>
+                <a:spcPct val="90000"/>
+              </a:lnSpc>
+              <a:spcBef>
+                <a:spcPts val="500"/>
+              </a:spcBef>
+              <a:buFont typeface="Arial" panose="020B0604020202020204" pitchFamily="34" charset="0"/>
+              <a:buNone/>
+              <a:defRPr sz="1600" kern="1200">
+                <a:solidFill>
+                  <a:schemeClr val="tx1"/>
+                </a:solidFill>
+                <a:latin typeface="+mn-lt"/>
+                <a:ea typeface="+mn-ea"/>
+                <a:cs typeface="+mn-cs"/>
+              </a:defRPr>
+            </a:lvl4pPr>
+            <a:lvl5pPr marL="1828800" indent="0" algn="ctr" defTabSz="914400" rtl="0" eaLnBrk="1" latinLnBrk="0" hangingPunct="1">
+              <a:lnSpc>
+                <a:spcPct val="90000"/>
+              </a:lnSpc>
+              <a:spcBef>
+                <a:spcPts val="500"/>
+              </a:spcBef>
+              <a:buFont typeface="Arial" panose="020B0604020202020204" pitchFamily="34" charset="0"/>
+              <a:buNone/>
+              <a:defRPr sz="1600" kern="1200">
+                <a:solidFill>
+                  <a:schemeClr val="tx1"/>
+                </a:solidFill>
+                <a:latin typeface="+mn-lt"/>
+                <a:ea typeface="+mn-ea"/>
+                <a:cs typeface="+mn-cs"/>
+              </a:defRPr>
+            </a:lvl5pPr>
+            <a:lvl6pPr marL="2286000" indent="0" algn="ctr" defTabSz="914400" rtl="0" eaLnBrk="1" latinLnBrk="0" hangingPunct="1">
+              <a:lnSpc>
+                <a:spcPct val="90000"/>
+              </a:lnSpc>
+              <a:spcBef>
+                <a:spcPts val="500"/>
+              </a:spcBef>
+              <a:buFont typeface="Arial" panose="020B0604020202020204" pitchFamily="34" charset="0"/>
+              <a:buNone/>
+              <a:defRPr sz="1600" kern="1200">
+                <a:solidFill>
+                  <a:schemeClr val="tx1"/>
+                </a:solidFill>
+                <a:latin typeface="+mn-lt"/>
+                <a:ea typeface="+mn-ea"/>
+                <a:cs typeface="+mn-cs"/>
+              </a:defRPr>
+            </a:lvl6pPr>
+            <a:lvl7pPr marL="2743200" indent="0" algn="ctr" defTabSz="914400" rtl="0" eaLnBrk="1" latinLnBrk="0" hangingPunct="1">
+              <a:lnSpc>
+                <a:spcPct val="90000"/>
+              </a:lnSpc>
+              <a:spcBef>
+                <a:spcPts val="500"/>
+              </a:spcBef>
+              <a:buFont typeface="Arial" panose="020B0604020202020204" pitchFamily="34" charset="0"/>
+              <a:buNone/>
+              <a:defRPr sz="1600" kern="1200">
+                <a:solidFill>
+                  <a:schemeClr val="tx1"/>
+                </a:solidFill>
+                <a:latin typeface="+mn-lt"/>
+                <a:ea typeface="+mn-ea"/>
+                <a:cs typeface="+mn-cs"/>
+              </a:defRPr>
+            </a:lvl7pPr>
+            <a:lvl8pPr marL="3200400" indent="0" algn="ctr" defTabSz="914400" rtl="0" eaLnBrk="1" latinLnBrk="0" hangingPunct="1">
+              <a:lnSpc>
+                <a:spcPct val="90000"/>
+              </a:lnSpc>
+              <a:spcBef>
+                <a:spcPts val="500"/>
+              </a:spcBef>
+              <a:buFont typeface="Arial" panose="020B0604020202020204" pitchFamily="34" charset="0"/>
+              <a:buNone/>
+              <a:defRPr sz="1600" kern="1200">
+                <a:solidFill>
+                  <a:schemeClr val="tx1"/>
+                </a:solidFill>
+                <a:latin typeface="+mn-lt"/>
+                <a:ea typeface="+mn-ea"/>
+                <a:cs typeface="+mn-cs"/>
+              </a:defRPr>
+            </a:lvl8pPr>
+            <a:lvl9pPr marL="3657600" indent="0" algn="ctr" defTabSz="914400" rtl="0" eaLnBrk="1" latinLnBrk="0" hangingPunct="1">
+              <a:lnSpc>
+                <a:spcPct val="90000"/>
+              </a:lnSpc>
+              <a:spcBef>
+                <a:spcPts val="500"/>
+              </a:spcBef>
+              <a:buFont typeface="Arial" panose="020B0604020202020204" pitchFamily="34" charset="0"/>
+              <a:buNone/>
+              <a:defRPr sz="1600" kern="1200">
+                <a:solidFill>
+                  <a:schemeClr val="tx1"/>
+                </a:solidFill>
+                <a:latin typeface="+mn-lt"/>
+                <a:ea typeface="+mn-ea"/>
+                <a:cs typeface="+mn-cs"/>
+              </a:defRPr>
+            </a:lvl9pPr>
+          </a:lstStyle>
+          <a:p>
+            <a:pPr marL="285750" indent="-285750" algn="l">
+              <a:buFontTx/>
+              <a:buChar char="-"/>
+            </a:pPr>
+            <a:endParaRPr lang="en-GB" sz="1000" i="1"/>
+          </a:p>
+        </p:txBody>
+      </p:sp>
+      <p:sp>
+        <p:nvSpPr>
+          <p:cNvPr id="5" name="Subtitle 2">
+            <a:extLst>
+              <a:ext uri="{FF2B5EF4-FFF2-40B4-BE49-F238E27FC236}">
+                <a16:creationId xmlns:a16="http://schemas.microsoft.com/office/drawing/2014/main" id="{BBA13038-CAB8-FCA0-CDE8-65E40C2F10A3}"/>
+              </a:ext>
+            </a:extLst>
+          </p:cNvPr>
+          <p:cNvSpPr txBox="1">
+            <a:spLocks/>
+          </p:cNvSpPr>
+          <p:nvPr/>
+        </p:nvSpPr>
+        <p:spPr>
+          <a:xfrm>
+            <a:off x="1835150" y="3429000"/>
+            <a:ext cx="9137650" cy="2400657"/>
+          </a:xfrm>
+          <a:prstGeom prst="rect">
+            <a:avLst/>
+          </a:prstGeom>
+        </p:spPr>
+        <p:txBody>
+          <a:bodyPr vert="horz" lIns="91440" tIns="45720" rIns="91440" bIns="45720" rtlCol="0">
+            <a:normAutofit/>
+          </a:bodyPr>
+          <a:lstStyle>
+            <a:lvl1pPr marL="0" indent="0" algn="ctr" defTabSz="914400" rtl="0" eaLnBrk="1" latinLnBrk="0" hangingPunct="1">
+              <a:lnSpc>
+                <a:spcPct val="90000"/>
+              </a:lnSpc>
+              <a:spcBef>
+                <a:spcPts val="1000"/>
+              </a:spcBef>
+              <a:buFont typeface="Arial" panose="020B0604020202020204" pitchFamily="34" charset="0"/>
+              <a:buNone/>
+              <a:defRPr sz="2400" kern="1200">
+                <a:solidFill>
+                  <a:schemeClr val="tx1"/>
+                </a:solidFill>
+                <a:latin typeface="+mn-lt"/>
+                <a:ea typeface="+mn-ea"/>
+                <a:cs typeface="+mn-cs"/>
+              </a:defRPr>
+            </a:lvl1pPr>
+            <a:lvl2pPr marL="457200" indent="0" algn="ctr" defTabSz="914400" rtl="0" eaLnBrk="1" latinLnBrk="0" hangingPunct="1">
+              <a:lnSpc>
+                <a:spcPct val="90000"/>
+              </a:lnSpc>
+              <a:spcBef>
+                <a:spcPts val="500"/>
+              </a:spcBef>
+              <a:buFont typeface="Arial" panose="020B0604020202020204" pitchFamily="34" charset="0"/>
+              <a:buNone/>
+              <a:defRPr sz="2000" kern="1200">
+                <a:solidFill>
+                  <a:schemeClr val="tx1"/>
+                </a:solidFill>
+                <a:latin typeface="+mn-lt"/>
+                <a:ea typeface="+mn-ea"/>
+                <a:cs typeface="+mn-cs"/>
+              </a:defRPr>
+            </a:lvl2pPr>
+            <a:lvl3pPr marL="914400" indent="0" algn="ctr" defTabSz="914400" rtl="0" eaLnBrk="1" latinLnBrk="0" hangingPunct="1">
+              <a:lnSpc>
+                <a:spcPct val="90000"/>
+              </a:lnSpc>
+              <a:spcBef>
+                <a:spcPts val="500"/>
+              </a:spcBef>
+              <a:buFont typeface="Arial" panose="020B0604020202020204" pitchFamily="34" charset="0"/>
+              <a:buNone/>
+              <a:defRPr sz="1800" kern="1200">
+                <a:solidFill>
+                  <a:schemeClr val="tx1"/>
+                </a:solidFill>
+                <a:latin typeface="+mn-lt"/>
+                <a:ea typeface="+mn-ea"/>
+                <a:cs typeface="+mn-cs"/>
+              </a:defRPr>
+            </a:lvl3pPr>
+            <a:lvl4pPr marL="1371600" indent="0" algn="ctr" defTabSz="914400" rtl="0" eaLnBrk="1" latinLnBrk="0" hangingPunct="1">
+              <a:lnSpc>
+                <a:spcPct val="90000"/>
+              </a:lnSpc>
+              <a:spcBef>
+                <a:spcPts val="500"/>
+              </a:spcBef>
+              <a:buFont typeface="Arial" panose="020B0604020202020204" pitchFamily="34" charset="0"/>
+              <a:buNone/>
+              <a:defRPr sz="1600" kern="1200">
+                <a:solidFill>
+                  <a:schemeClr val="tx1"/>
+                </a:solidFill>
+                <a:latin typeface="+mn-lt"/>
+                <a:ea typeface="+mn-ea"/>
+                <a:cs typeface="+mn-cs"/>
+              </a:defRPr>
+            </a:lvl4pPr>
+            <a:lvl5pPr marL="1828800" indent="0" algn="ctr" defTabSz="914400" rtl="0" eaLnBrk="1" latinLnBrk="0" hangingPunct="1">
+              <a:lnSpc>
+                <a:spcPct val="90000"/>
+              </a:lnSpc>
+              <a:spcBef>
+                <a:spcPts val="500"/>
+              </a:spcBef>
+              <a:buFont typeface="Arial" panose="020B0604020202020204" pitchFamily="34" charset="0"/>
+              <a:buNone/>
+              <a:defRPr sz="1600" kern="1200">
+                <a:solidFill>
+                  <a:schemeClr val="tx1"/>
+                </a:solidFill>
+                <a:latin typeface="+mn-lt"/>
+                <a:ea typeface="+mn-ea"/>
+                <a:cs typeface="+mn-cs"/>
+              </a:defRPr>
+            </a:lvl5pPr>
+            <a:lvl6pPr marL="2286000" indent="0" algn="ctr" defTabSz="914400" rtl="0" eaLnBrk="1" latinLnBrk="0" hangingPunct="1">
+              <a:lnSpc>
+                <a:spcPct val="90000"/>
+              </a:lnSpc>
+              <a:spcBef>
+                <a:spcPts val="500"/>
+              </a:spcBef>
+              <a:buFont typeface="Arial" panose="020B0604020202020204" pitchFamily="34" charset="0"/>
+              <a:buNone/>
+              <a:defRPr sz="1600" kern="1200">
+                <a:solidFill>
+                  <a:schemeClr val="tx1"/>
+                </a:solidFill>
+                <a:latin typeface="+mn-lt"/>
+                <a:ea typeface="+mn-ea"/>
+                <a:cs typeface="+mn-cs"/>
+              </a:defRPr>
+            </a:lvl6pPr>
+            <a:lvl7pPr marL="2743200" indent="0" algn="ctr" defTabSz="914400" rtl="0" eaLnBrk="1" latinLnBrk="0" hangingPunct="1">
+              <a:lnSpc>
+                <a:spcPct val="90000"/>
+              </a:lnSpc>
+              <a:spcBef>
+                <a:spcPts val="500"/>
+              </a:spcBef>
+              <a:buFont typeface="Arial" panose="020B0604020202020204" pitchFamily="34" charset="0"/>
+              <a:buNone/>
+              <a:defRPr sz="1600" kern="1200">
+                <a:solidFill>
+                  <a:schemeClr val="tx1"/>
+                </a:solidFill>
+                <a:latin typeface="+mn-lt"/>
+                <a:ea typeface="+mn-ea"/>
+                <a:cs typeface="+mn-cs"/>
+              </a:defRPr>
+            </a:lvl7pPr>
+            <a:lvl8pPr marL="3200400" indent="0" algn="ctr" defTabSz="914400" rtl="0" eaLnBrk="1" latinLnBrk="0" hangingPunct="1">
+              <a:lnSpc>
+                <a:spcPct val="90000"/>
+              </a:lnSpc>
+              <a:spcBef>
+                <a:spcPts val="500"/>
+              </a:spcBef>
+              <a:buFont typeface="Arial" panose="020B0604020202020204" pitchFamily="34" charset="0"/>
+              <a:buNone/>
+              <a:defRPr sz="1600" kern="1200">
+                <a:solidFill>
+                  <a:schemeClr val="tx1"/>
+                </a:solidFill>
+                <a:latin typeface="+mn-lt"/>
+                <a:ea typeface="+mn-ea"/>
+                <a:cs typeface="+mn-cs"/>
+              </a:defRPr>
+            </a:lvl8pPr>
+            <a:lvl9pPr marL="3657600" indent="0" algn="ctr" defTabSz="914400" rtl="0" eaLnBrk="1" latinLnBrk="0" hangingPunct="1">
+              <a:lnSpc>
+                <a:spcPct val="90000"/>
+              </a:lnSpc>
+              <a:spcBef>
+                <a:spcPts val="500"/>
+              </a:spcBef>
+              <a:buFont typeface="Arial" panose="020B0604020202020204" pitchFamily="34" charset="0"/>
+              <a:buNone/>
+              <a:defRPr sz="1600" kern="1200">
+                <a:solidFill>
+                  <a:schemeClr val="tx1"/>
+                </a:solidFill>
+                <a:latin typeface="+mn-lt"/>
+                <a:ea typeface="+mn-ea"/>
+                <a:cs typeface="+mn-cs"/>
+              </a:defRPr>
+            </a:lvl9pPr>
+          </a:lstStyle>
+          <a:p>
+            <a:pPr marL="285750" indent="-285750" algn="l">
+              <a:buFontTx/>
+              <a:buChar char="-"/>
+            </a:pPr>
+            <a:endParaRPr lang="en-GB" sz="1000" i="1"/>
+          </a:p>
+        </p:txBody>
+      </p:sp>
+      <p:sp>
+        <p:nvSpPr>
+          <p:cNvPr id="7" name="Subtitle 2">
+            <a:extLst>
+              <a:ext uri="{FF2B5EF4-FFF2-40B4-BE49-F238E27FC236}">
+                <a16:creationId xmlns:a16="http://schemas.microsoft.com/office/drawing/2014/main" id="{735C0034-9699-F9D9-6534-306539359175}"/>
+              </a:ext>
+            </a:extLst>
+          </p:cNvPr>
+          <p:cNvSpPr txBox="1">
+            <a:spLocks/>
+          </p:cNvSpPr>
+          <p:nvPr/>
+        </p:nvSpPr>
+        <p:spPr>
+          <a:xfrm>
+            <a:off x="0" y="2028102"/>
+            <a:ext cx="12192000" cy="4829898"/>
+          </a:xfrm>
+          <a:prstGeom prst="rect">
+            <a:avLst/>
+          </a:prstGeom>
+        </p:spPr>
+        <p:txBody>
+          <a:bodyPr vert="horz" lIns="91440" tIns="45720" rIns="91440" bIns="45720" rtlCol="0">
+            <a:normAutofit/>
+          </a:bodyPr>
+          <a:lstStyle>
+            <a:lvl1pPr marL="0" indent="0" algn="ctr" defTabSz="914400" rtl="0" eaLnBrk="1" latinLnBrk="0" hangingPunct="1">
+              <a:lnSpc>
+                <a:spcPct val="90000"/>
+              </a:lnSpc>
+              <a:spcBef>
+                <a:spcPts val="1000"/>
+              </a:spcBef>
+              <a:buFont typeface="Arial" panose="020B0604020202020204" pitchFamily="34" charset="0"/>
+              <a:buNone/>
+              <a:defRPr sz="2400" kern="1200">
+                <a:solidFill>
+                  <a:schemeClr val="tx1"/>
+                </a:solidFill>
+                <a:latin typeface="+mn-lt"/>
+                <a:ea typeface="+mn-ea"/>
+                <a:cs typeface="+mn-cs"/>
+              </a:defRPr>
+            </a:lvl1pPr>
+            <a:lvl2pPr marL="457200" indent="0" algn="ctr" defTabSz="914400" rtl="0" eaLnBrk="1" latinLnBrk="0" hangingPunct="1">
+              <a:lnSpc>
+                <a:spcPct val="90000"/>
+              </a:lnSpc>
+              <a:spcBef>
+                <a:spcPts val="500"/>
+              </a:spcBef>
+              <a:buFont typeface="Arial" panose="020B0604020202020204" pitchFamily="34" charset="0"/>
+              <a:buNone/>
+              <a:defRPr sz="2000" kern="1200">
+                <a:solidFill>
+                  <a:schemeClr val="tx1"/>
+                </a:solidFill>
+                <a:latin typeface="+mn-lt"/>
+                <a:ea typeface="+mn-ea"/>
+                <a:cs typeface="+mn-cs"/>
+              </a:defRPr>
+            </a:lvl2pPr>
+            <a:lvl3pPr marL="914400" indent="0" algn="ctr" defTabSz="914400" rtl="0" eaLnBrk="1" latinLnBrk="0" hangingPunct="1">
+              <a:lnSpc>
+                <a:spcPct val="90000"/>
+              </a:lnSpc>
+              <a:spcBef>
+                <a:spcPts val="500"/>
+              </a:spcBef>
+              <a:buFont typeface="Arial" panose="020B0604020202020204" pitchFamily="34" charset="0"/>
+              <a:buNone/>
+              <a:defRPr sz="1800" kern="1200">
+                <a:solidFill>
+                  <a:schemeClr val="tx1"/>
+                </a:solidFill>
+                <a:latin typeface="+mn-lt"/>
+                <a:ea typeface="+mn-ea"/>
+                <a:cs typeface="+mn-cs"/>
+              </a:defRPr>
+            </a:lvl3pPr>
+            <a:lvl4pPr marL="1371600" indent="0" algn="ctr" defTabSz="914400" rtl="0" eaLnBrk="1" latinLnBrk="0" hangingPunct="1">
+              <a:lnSpc>
+                <a:spcPct val="90000"/>
+              </a:lnSpc>
+              <a:spcBef>
+                <a:spcPts val="500"/>
+              </a:spcBef>
+              <a:buFont typeface="Arial" panose="020B0604020202020204" pitchFamily="34" charset="0"/>
+              <a:buNone/>
+              <a:defRPr sz="1600" kern="1200">
+                <a:solidFill>
+                  <a:schemeClr val="tx1"/>
+                </a:solidFill>
+                <a:latin typeface="+mn-lt"/>
+                <a:ea typeface="+mn-ea"/>
+                <a:cs typeface="+mn-cs"/>
+              </a:defRPr>
+            </a:lvl4pPr>
+            <a:lvl5pPr marL="1828800" indent="0" algn="ctr" defTabSz="914400" rtl="0" eaLnBrk="1" latinLnBrk="0" hangingPunct="1">
+              <a:lnSpc>
+                <a:spcPct val="90000"/>
+              </a:lnSpc>
+              <a:spcBef>
+                <a:spcPts val="500"/>
+              </a:spcBef>
+              <a:buFont typeface="Arial" panose="020B0604020202020204" pitchFamily="34" charset="0"/>
+              <a:buNone/>
+              <a:defRPr sz="1600" kern="1200">
+                <a:solidFill>
+                  <a:schemeClr val="tx1"/>
+                </a:solidFill>
+                <a:latin typeface="+mn-lt"/>
+                <a:ea typeface="+mn-ea"/>
+                <a:cs typeface="+mn-cs"/>
+              </a:defRPr>
+            </a:lvl5pPr>
+            <a:lvl6pPr marL="2286000" indent="0" algn="ctr" defTabSz="914400" rtl="0" eaLnBrk="1" latinLnBrk="0" hangingPunct="1">
+              <a:lnSpc>
+                <a:spcPct val="90000"/>
+              </a:lnSpc>
+              <a:spcBef>
+                <a:spcPts val="500"/>
+              </a:spcBef>
+              <a:buFont typeface="Arial" panose="020B0604020202020204" pitchFamily="34" charset="0"/>
+              <a:buNone/>
+              <a:defRPr sz="1600" kern="1200">
+                <a:solidFill>
+                  <a:schemeClr val="tx1"/>
+                </a:solidFill>
+                <a:latin typeface="+mn-lt"/>
+                <a:ea typeface="+mn-ea"/>
+                <a:cs typeface="+mn-cs"/>
+              </a:defRPr>
+            </a:lvl6pPr>
+            <a:lvl7pPr marL="2743200" indent="0" algn="ctr" defTabSz="914400" rtl="0" eaLnBrk="1" latinLnBrk="0" hangingPunct="1">
+              <a:lnSpc>
+                <a:spcPct val="90000"/>
+              </a:lnSpc>
+              <a:spcBef>
+                <a:spcPts val="500"/>
+              </a:spcBef>
+              <a:buFont typeface="Arial" panose="020B0604020202020204" pitchFamily="34" charset="0"/>
+              <a:buNone/>
+              <a:defRPr sz="1600" kern="1200">
+                <a:solidFill>
+                  <a:schemeClr val="tx1"/>
+                </a:solidFill>
+                <a:latin typeface="+mn-lt"/>
+                <a:ea typeface="+mn-ea"/>
+                <a:cs typeface="+mn-cs"/>
+              </a:defRPr>
+            </a:lvl7pPr>
+            <a:lvl8pPr marL="3200400" indent="0" algn="ctr" defTabSz="914400" rtl="0" eaLnBrk="1" latinLnBrk="0" hangingPunct="1">
+              <a:lnSpc>
+                <a:spcPct val="90000"/>
+              </a:lnSpc>
+              <a:spcBef>
+                <a:spcPts val="500"/>
+              </a:spcBef>
+              <a:buFont typeface="Arial" panose="020B0604020202020204" pitchFamily="34" charset="0"/>
+              <a:buNone/>
+              <a:defRPr sz="1600" kern="1200">
+                <a:solidFill>
+                  <a:schemeClr val="tx1"/>
+                </a:solidFill>
+                <a:latin typeface="+mn-lt"/>
+                <a:ea typeface="+mn-ea"/>
+                <a:cs typeface="+mn-cs"/>
+              </a:defRPr>
+            </a:lvl8pPr>
+            <a:lvl9pPr marL="3657600" indent="0" algn="ctr" defTabSz="914400" rtl="0" eaLnBrk="1" latinLnBrk="0" hangingPunct="1">
+              <a:lnSpc>
+                <a:spcPct val="90000"/>
+              </a:lnSpc>
+              <a:spcBef>
+                <a:spcPts val="500"/>
+              </a:spcBef>
+              <a:buFont typeface="Arial" panose="020B0604020202020204" pitchFamily="34" charset="0"/>
+              <a:buNone/>
+              <a:defRPr sz="1600" kern="1200">
+                <a:solidFill>
+                  <a:schemeClr val="tx1"/>
+                </a:solidFill>
+                <a:latin typeface="+mn-lt"/>
+                <a:ea typeface="+mn-ea"/>
+                <a:cs typeface="+mn-cs"/>
+              </a:defRPr>
+            </a:lvl9pPr>
+          </a:lstStyle>
+          <a:p>
+            <a:pPr marL="285750" indent="-285750" algn="l">
+              <a:buFontTx/>
+              <a:buChar char="-"/>
+            </a:pPr>
+            <a:endParaRPr lang="en-GB" sz="1800"/>
+          </a:p>
+          <a:p>
+            <a:pPr marL="285750" indent="-285750" algn="l">
+              <a:buFontTx/>
+              <a:buChar char="-"/>
+            </a:pPr>
+            <a:endParaRPr lang="en-GB" sz="1000" i="1"/>
+          </a:p>
+        </p:txBody>
+      </p:sp>
+      <p:sp>
+        <p:nvSpPr>
+          <p:cNvPr id="6" name="Subtitle 2">
+            <a:extLst>
+              <a:ext uri="{FF2B5EF4-FFF2-40B4-BE49-F238E27FC236}">
+                <a16:creationId xmlns:a16="http://schemas.microsoft.com/office/drawing/2014/main" id="{B6186AA4-73D5-4BB7-63DD-3879981B8F89}"/>
+              </a:ext>
+            </a:extLst>
+          </p:cNvPr>
+          <p:cNvSpPr txBox="1">
+            <a:spLocks/>
+          </p:cNvSpPr>
+          <p:nvPr/>
+        </p:nvSpPr>
+        <p:spPr>
+          <a:xfrm>
+            <a:off x="0" y="1098550"/>
+            <a:ext cx="12192000" cy="5759450"/>
+          </a:xfrm>
+          <a:prstGeom prst="rect">
+            <a:avLst/>
+          </a:prstGeom>
+        </p:spPr>
+        <p:txBody>
+          <a:bodyPr vert="horz" lIns="91440" tIns="45720" rIns="91440" bIns="45720" rtlCol="0">
+            <a:normAutofit/>
+          </a:bodyPr>
+          <a:lstStyle>
+            <a:lvl1pPr marL="0" indent="0" algn="ctr" defTabSz="914400" rtl="0" eaLnBrk="1" latinLnBrk="0" hangingPunct="1">
+              <a:lnSpc>
+                <a:spcPct val="90000"/>
+              </a:lnSpc>
+              <a:spcBef>
+                <a:spcPts val="1000"/>
+              </a:spcBef>
+              <a:buFont typeface="Arial" panose="020B0604020202020204" pitchFamily="34" charset="0"/>
+              <a:buNone/>
+              <a:defRPr sz="2400" kern="1200">
+                <a:solidFill>
+                  <a:schemeClr val="tx1"/>
+                </a:solidFill>
+                <a:latin typeface="+mn-lt"/>
+                <a:ea typeface="+mn-ea"/>
+                <a:cs typeface="+mn-cs"/>
+              </a:defRPr>
+            </a:lvl1pPr>
+            <a:lvl2pPr marL="457200" indent="0" algn="ctr" defTabSz="914400" rtl="0" eaLnBrk="1" latinLnBrk="0" hangingPunct="1">
+              <a:lnSpc>
+                <a:spcPct val="90000"/>
+              </a:lnSpc>
+              <a:spcBef>
+                <a:spcPts val="500"/>
+              </a:spcBef>
+              <a:buFont typeface="Arial" panose="020B0604020202020204" pitchFamily="34" charset="0"/>
+              <a:buNone/>
+              <a:defRPr sz="2000" kern="1200">
+                <a:solidFill>
+                  <a:schemeClr val="tx1"/>
+                </a:solidFill>
+                <a:latin typeface="+mn-lt"/>
+                <a:ea typeface="+mn-ea"/>
+                <a:cs typeface="+mn-cs"/>
+              </a:defRPr>
+            </a:lvl2pPr>
+            <a:lvl3pPr marL="914400" indent="0" algn="ctr" defTabSz="914400" rtl="0" eaLnBrk="1" latinLnBrk="0" hangingPunct="1">
+              <a:lnSpc>
+                <a:spcPct val="90000"/>
+              </a:lnSpc>
+              <a:spcBef>
+                <a:spcPts val="500"/>
+              </a:spcBef>
+              <a:buFont typeface="Arial" panose="020B0604020202020204" pitchFamily="34" charset="0"/>
+              <a:buNone/>
+              <a:defRPr sz="1800" kern="1200">
+                <a:solidFill>
+                  <a:schemeClr val="tx1"/>
+                </a:solidFill>
+                <a:latin typeface="+mn-lt"/>
+                <a:ea typeface="+mn-ea"/>
+                <a:cs typeface="+mn-cs"/>
+              </a:defRPr>
+            </a:lvl3pPr>
+            <a:lvl4pPr marL="1371600" indent="0" algn="ctr" defTabSz="914400" rtl="0" eaLnBrk="1" latinLnBrk="0" hangingPunct="1">
+              <a:lnSpc>
+                <a:spcPct val="90000"/>
+              </a:lnSpc>
+              <a:spcBef>
+                <a:spcPts val="500"/>
+              </a:spcBef>
+              <a:buFont typeface="Arial" panose="020B0604020202020204" pitchFamily="34" charset="0"/>
+              <a:buNone/>
+              <a:defRPr sz="1600" kern="1200">
+                <a:solidFill>
+                  <a:schemeClr val="tx1"/>
+                </a:solidFill>
+                <a:latin typeface="+mn-lt"/>
+                <a:ea typeface="+mn-ea"/>
+                <a:cs typeface="+mn-cs"/>
+              </a:defRPr>
+            </a:lvl4pPr>
+            <a:lvl5pPr marL="1828800" indent="0" algn="ctr" defTabSz="914400" rtl="0" eaLnBrk="1" latinLnBrk="0" hangingPunct="1">
+              <a:lnSpc>
+                <a:spcPct val="90000"/>
+              </a:lnSpc>
+              <a:spcBef>
+                <a:spcPts val="500"/>
+              </a:spcBef>
+              <a:buFont typeface="Arial" panose="020B0604020202020204" pitchFamily="34" charset="0"/>
+              <a:buNone/>
+              <a:defRPr sz="1600" kern="1200">
+                <a:solidFill>
+                  <a:schemeClr val="tx1"/>
+                </a:solidFill>
+                <a:latin typeface="+mn-lt"/>
+                <a:ea typeface="+mn-ea"/>
+                <a:cs typeface="+mn-cs"/>
+              </a:defRPr>
+            </a:lvl5pPr>
+            <a:lvl6pPr marL="2286000" indent="0" algn="ctr" defTabSz="914400" rtl="0" eaLnBrk="1" latinLnBrk="0" hangingPunct="1">
+              <a:lnSpc>
+                <a:spcPct val="90000"/>
+              </a:lnSpc>
+              <a:spcBef>
+                <a:spcPts val="500"/>
+              </a:spcBef>
+              <a:buFont typeface="Arial" panose="020B0604020202020204" pitchFamily="34" charset="0"/>
+              <a:buNone/>
+              <a:defRPr sz="1600" kern="1200">
+                <a:solidFill>
+                  <a:schemeClr val="tx1"/>
+                </a:solidFill>
+                <a:latin typeface="+mn-lt"/>
+                <a:ea typeface="+mn-ea"/>
+                <a:cs typeface="+mn-cs"/>
+              </a:defRPr>
+            </a:lvl6pPr>
+            <a:lvl7pPr marL="2743200" indent="0" algn="ctr" defTabSz="914400" rtl="0" eaLnBrk="1" latinLnBrk="0" hangingPunct="1">
+              <a:lnSpc>
+                <a:spcPct val="90000"/>
+              </a:lnSpc>
+              <a:spcBef>
+                <a:spcPts val="500"/>
+              </a:spcBef>
+              <a:buFont typeface="Arial" panose="020B0604020202020204" pitchFamily="34" charset="0"/>
+              <a:buNone/>
+              <a:defRPr sz="1600" kern="1200">
+                <a:solidFill>
+                  <a:schemeClr val="tx1"/>
+                </a:solidFill>
+                <a:latin typeface="+mn-lt"/>
+                <a:ea typeface="+mn-ea"/>
+                <a:cs typeface="+mn-cs"/>
+              </a:defRPr>
+            </a:lvl7pPr>
+            <a:lvl8pPr marL="3200400" indent="0" algn="ctr" defTabSz="914400" rtl="0" eaLnBrk="1" latinLnBrk="0" hangingPunct="1">
+              <a:lnSpc>
+                <a:spcPct val="90000"/>
+              </a:lnSpc>
+              <a:spcBef>
+                <a:spcPts val="500"/>
+              </a:spcBef>
+              <a:buFont typeface="Arial" panose="020B0604020202020204" pitchFamily="34" charset="0"/>
+              <a:buNone/>
+              <a:defRPr sz="1600" kern="1200">
+                <a:solidFill>
+                  <a:schemeClr val="tx1"/>
+                </a:solidFill>
+                <a:latin typeface="+mn-lt"/>
+                <a:ea typeface="+mn-ea"/>
+                <a:cs typeface="+mn-cs"/>
+              </a:defRPr>
+            </a:lvl8pPr>
+            <a:lvl9pPr marL="3657600" indent="0" algn="ctr" defTabSz="914400" rtl="0" eaLnBrk="1" latinLnBrk="0" hangingPunct="1">
+              <a:lnSpc>
+                <a:spcPct val="90000"/>
+              </a:lnSpc>
+              <a:spcBef>
+                <a:spcPts val="500"/>
+              </a:spcBef>
+              <a:buFont typeface="Arial" panose="020B0604020202020204" pitchFamily="34" charset="0"/>
+              <a:buNone/>
+              <a:defRPr sz="1600" kern="1200">
+                <a:solidFill>
+                  <a:schemeClr val="tx1"/>
+                </a:solidFill>
+                <a:latin typeface="+mn-lt"/>
+                <a:ea typeface="+mn-ea"/>
+                <a:cs typeface="+mn-cs"/>
+              </a:defRPr>
+            </a:lvl9pPr>
+          </a:lstStyle>
+          <a:p>
+            <a:pPr algn="l"/>
+            <a:r>
+              <a:rPr lang="en-GB" sz="1800"/>
+              <a:t>III) Creating object </a:t>
+            </a:r>
+            <a:r>
+              <a:rPr lang="en-GB" sz="800" b="1" i="1"/>
+              <a:t>(illustrating the code)</a:t>
+            </a:r>
+          </a:p>
+          <a:p>
+            <a:pPr algn="l"/>
+            <a:r>
+              <a:rPr lang="en-GB" sz="1800"/>
+              <a:t>IV) Making objects interact</a:t>
+            </a:r>
+          </a:p>
+          <a:p>
+            <a:pPr marL="285750" indent="-285750" algn="l">
+              <a:buFontTx/>
+              <a:buChar char="-"/>
+            </a:pPr>
+            <a:r>
+              <a:rPr lang="en-GB" sz="1800"/>
+              <a:t>Interact by </a:t>
+            </a:r>
+            <a:r>
+              <a:rPr lang="en-GB" sz="1800" b="1" i="1">
+                <a:solidFill>
+                  <a:srgbClr val="FF0000"/>
+                </a:solidFill>
+              </a:rPr>
+              <a:t>“reference”</a:t>
+            </a:r>
+          </a:p>
+          <a:p>
+            <a:pPr algn="l"/>
+            <a:r>
+              <a:rPr lang="en-GB" sz="1800"/>
+              <a:t>V) Launching a Java program </a:t>
+            </a:r>
+            <a:r>
+              <a:rPr lang="en-GB" sz="800" b="1" i="1"/>
+              <a:t>(illustrating the code)</a:t>
+            </a:r>
+          </a:p>
+          <a:p>
+            <a:pPr marL="285750" indent="-285750" algn="l">
+              <a:buFontTx/>
+              <a:buChar char="-"/>
+            </a:pPr>
+            <a:r>
+              <a:rPr lang="en-GB" sz="1800"/>
+              <a:t>“main” =&gt; object interact </a:t>
+            </a:r>
+          </a:p>
+          <a:p>
+            <a:pPr algn="l"/>
+            <a:endParaRPr lang="en-GB" sz="1800"/>
+          </a:p>
+          <a:p>
+            <a:pPr algn="l"/>
+            <a:r>
+              <a:rPr lang="en-GB" sz="800"/>
+              <a:t> </a:t>
+            </a:r>
+          </a:p>
+          <a:p>
+            <a:pPr algn="l"/>
+            <a:endParaRPr lang="en-GB" sz="800" b="1" i="1"/>
+          </a:p>
+        </p:txBody>
+      </p:sp>
+    </p:spTree>
+    <p:extLst>
+      <p:ext uri="{BB962C8B-B14F-4D97-AF65-F5344CB8AC3E}">
+        <p14:creationId xmlns:p14="http://schemas.microsoft.com/office/powerpoint/2010/main" val="3360451873"/>
+      </p:ext>
+    </p:extLst>
+  </p:cSld>
+  <p:clrMapOvr>
+    <a:masterClrMapping/>
+  </p:clrMapOvr>
 </p:sld>
 </file>
 

</xml_diff>